<commit_message>
Small Changes to pwr pt
</commit_message>
<xml_diff>
--- a/Documentation/Project Documentation/Project Presentation.pptx
+++ b/Documentation/Project Documentation/Project Presentation.pptx
@@ -132,7 +132,7 @@
   </p:defaultTextStyle>
   <p:extLst>
     <p:ext uri="{EFAFB233-063F-42B5-8137-9DF3F51BA10A}">
-      <p15:sldGuideLst xmlns:p15="http://schemas.microsoft.com/office/powerpoint/2012/main" xmlns="">
+      <p15:sldGuideLst xmlns="" xmlns:p15="http://schemas.microsoft.com/office/powerpoint/2012/main">
         <p15:guide id="1" orient="horz" pos="2160">
           <p15:clr>
             <a:srgbClr val="A4A3A4"/>
@@ -208,7 +208,7 @@
           <a:p>
             <a:fld id="{B6C9204B-584D-48F9-AD68-3D4498C91AF3}" type="datetimeFigureOut">
               <a:rPr lang="en-US" smtClean="0"/>
-              <a:t>12/9/2013</a:t>
+              <a:t>12/10/2013</a:t>
             </a:fld>
             <a:endParaRPr lang="en-US"/>
           </a:p>
@@ -524,7 +524,7 @@
           <a:p>
             <a:fld id="{B6C9204B-584D-48F9-AD68-3D4498C91AF3}" type="datetimeFigureOut">
               <a:rPr lang="en-US" smtClean="0"/>
-              <a:t>12/9/2013</a:t>
+              <a:t>12/10/2013</a:t>
             </a:fld>
             <a:endParaRPr lang="en-US"/>
           </a:p>
@@ -699,7 +699,7 @@
           <a:p>
             <a:fld id="{B6C9204B-584D-48F9-AD68-3D4498C91AF3}" type="datetimeFigureOut">
               <a:rPr lang="en-US" smtClean="0"/>
-              <a:t>12/9/2013</a:t>
+              <a:t>12/10/2013</a:t>
             </a:fld>
             <a:endParaRPr lang="en-US"/>
           </a:p>
@@ -817,7 +817,7 @@
           <a:p>
             <a:fld id="{B6C9204B-584D-48F9-AD68-3D4498C91AF3}" type="datetimeFigureOut">
               <a:rPr lang="en-US" smtClean="0"/>
-              <a:t>12/9/2013</a:t>
+              <a:t>12/10/2013</a:t>
             </a:fld>
             <a:endParaRPr lang="en-US"/>
           </a:p>
@@ -1115,7 +1115,7 @@
           <a:p>
             <a:fld id="{B6C9204B-584D-48F9-AD68-3D4498C91AF3}" type="datetimeFigureOut">
               <a:rPr lang="en-US" smtClean="0"/>
-              <a:t>12/9/2013</a:t>
+              <a:t>12/10/2013</a:t>
             </a:fld>
             <a:endParaRPr lang="en-US"/>
           </a:p>
@@ -1408,7 +1408,7 @@
           <a:p>
             <a:fld id="{B6C9204B-584D-48F9-AD68-3D4498C91AF3}" type="datetimeFigureOut">
               <a:rPr lang="en-US" smtClean="0"/>
-              <a:t>12/9/2013</a:t>
+              <a:t>12/10/2013</a:t>
             </a:fld>
             <a:endParaRPr lang="en-US"/>
           </a:p>
@@ -1836,7 +1836,7 @@
           <a:p>
             <a:fld id="{B6C9204B-584D-48F9-AD68-3D4498C91AF3}" type="datetimeFigureOut">
               <a:rPr lang="en-US" smtClean="0"/>
-              <a:t>12/9/2013</a:t>
+              <a:t>12/10/2013</a:t>
             </a:fld>
             <a:endParaRPr lang="en-US"/>
           </a:p>
@@ -1954,7 +1954,7 @@
           <a:p>
             <a:fld id="{B6C9204B-584D-48F9-AD68-3D4498C91AF3}" type="datetimeFigureOut">
               <a:rPr lang="en-US" smtClean="0"/>
-              <a:t>12/9/2013</a:t>
+              <a:t>12/10/2013</a:t>
             </a:fld>
             <a:endParaRPr lang="en-US"/>
           </a:p>
@@ -2044,7 +2044,7 @@
           <a:p>
             <a:fld id="{B6C9204B-584D-48F9-AD68-3D4498C91AF3}" type="datetimeFigureOut">
               <a:rPr lang="en-US" smtClean="0"/>
-              <a:t>12/9/2013</a:t>
+              <a:t>12/10/2013</a:t>
             </a:fld>
             <a:endParaRPr lang="en-US"/>
           </a:p>
@@ -2294,7 +2294,7 @@
           <a:p>
             <a:fld id="{B6C9204B-584D-48F9-AD68-3D4498C91AF3}" type="datetimeFigureOut">
               <a:rPr lang="en-US" smtClean="0"/>
-              <a:t>12/9/2013</a:t>
+              <a:t>12/10/2013</a:t>
             </a:fld>
             <a:endParaRPr lang="en-US"/>
           </a:p>
@@ -2810,7 +2810,7 @@
           <a:p>
             <a:fld id="{B6C9204B-584D-48F9-AD68-3D4498C91AF3}" type="datetimeFigureOut">
               <a:rPr lang="en-US" smtClean="0"/>
-              <a:t>12/9/2013</a:t>
+              <a:t>12/10/2013</a:t>
             </a:fld>
             <a:endParaRPr lang="en-US"/>
           </a:p>
@@ -3040,7 +3040,7 @@
           <a:p>
             <a:fld id="{B6C9204B-584D-48F9-AD68-3D4498C91AF3}" type="datetimeFigureOut">
               <a:rPr lang="en-US" smtClean="0"/>
-              <a:t>12/9/2013</a:t>
+              <a:t>12/10/2013</a:t>
             </a:fld>
             <a:endParaRPr lang="en-US"/>
           </a:p>
@@ -3896,8 +3896,13 @@
           <a:p>
             <a:r>
               <a:rPr lang="en-US" dirty="0" smtClean="0"/>
-              <a:t>The board layout was sent to OSH Park for fabrication</a:t>
-            </a:r>
+              <a:t>The board layout was sent to OSH Park for </a:t>
+            </a:r>
+            <a:r>
+              <a:rPr lang="en-US" dirty="0" smtClean="0"/>
+              <a:t>fabrication using their design rules</a:t>
+            </a:r>
+            <a:endParaRPr lang="en-US" dirty="0" smtClean="0"/>
           </a:p>
           <a:p>
             <a:r>
@@ -4591,7 +4596,15 @@
           <a:p>
             <a:r>
               <a:rPr lang="en-US" dirty="0" smtClean="0"/>
-              <a:t>Implementing these COTS Items cost an extra 10$ per board, and added design, and implementation constraints.  </a:t>
+              <a:t>Implementing these COTS Items cost an extra </a:t>
+            </a:r>
+            <a:r>
+              <a:rPr lang="en-US" dirty="0" smtClean="0"/>
+              <a:t>$10 </a:t>
+            </a:r>
+            <a:r>
+              <a:rPr lang="en-US" dirty="0" smtClean="0"/>
+              <a:t>per board, and added design, and implementation constraints.  </a:t>
             </a:r>
           </a:p>
           <a:p>
@@ -4837,7 +4850,7 @@
           <a:p>
             <a:r>
               <a:rPr lang="en-US" dirty="0" smtClean="0"/>
-              <a:t>Need</a:t>
+              <a:t>Needs</a:t>
             </a:r>
             <a:endParaRPr lang="en-US" dirty="0"/>
           </a:p>
@@ -5279,11 +5292,7 @@
           <a:p>
             <a:r>
               <a:rPr lang="en-US" dirty="0" smtClean="0"/>
-              <a:t>Major contributor to group homewor</a:t>
-            </a:r>
-            <a:r>
-              <a:rPr lang="en-US" dirty="0" smtClean="0"/>
-              <a:t>k assignments and documentation</a:t>
+              <a:t>Major contributor to group homework assignments and documentation</a:t>
             </a:r>
             <a:endParaRPr lang="en-US" dirty="0"/>
           </a:p>
@@ -6247,15 +6256,7 @@
           <a:p>
             <a:r>
               <a:rPr lang="en-US" dirty="0" smtClean="0"/>
-              <a:t>Display on a LCD a heading either with a compass face or with letters </a:t>
-            </a:r>
-            <a:r>
-              <a:rPr lang="en-US" dirty="0" smtClean="0"/>
-              <a:t>(i.e. “NNW</a:t>
-            </a:r>
-            <a:r>
-              <a:rPr lang="en-US" dirty="0" smtClean="0"/>
-              <a:t>”) as well as a numerical value in degrees</a:t>
+              <a:t>Display on a LCD a heading either with a compass face or with letters (i.e. “NNW”) as well as a numerical value in degrees</a:t>
             </a:r>
           </a:p>
           <a:p>
@@ -6525,8 +6526,19 @@
           <a:p>
             <a:r>
               <a:rPr lang="en-US" dirty="0" smtClean="0"/>
-              <a:t>Order development boards from SparkFun for initial prototyping</a:t>
-            </a:r>
+              <a:t>Order development boards from SparkFun for initial </a:t>
+            </a:r>
+            <a:r>
+              <a:rPr lang="en-US" dirty="0" smtClean="0"/>
+              <a:t>prototyping</a:t>
+            </a:r>
+          </a:p>
+          <a:p>
+            <a:r>
+              <a:rPr lang="en-US" dirty="0" smtClean="0"/>
+              <a:t>Defining project requirements</a:t>
+            </a:r>
+            <a:endParaRPr lang="en-US" dirty="0" smtClean="0"/>
           </a:p>
         </p:txBody>
       </p:sp>

</xml_diff>

<commit_message>
Added more to PPT
</commit_message>
<xml_diff>
--- a/Documentation/Project Documentation/Project Presentation.pptx
+++ b/Documentation/Project Documentation/Project Presentation.pptx
@@ -17,12 +17,12 @@
     <p:sldId id="278" r:id="rId11"/>
     <p:sldId id="279" r:id="rId12"/>
     <p:sldId id="282" r:id="rId13"/>
-    <p:sldId id="263" r:id="rId14"/>
-    <p:sldId id="280" r:id="rId15"/>
-    <p:sldId id="281" r:id="rId16"/>
-    <p:sldId id="264" r:id="rId17"/>
-    <p:sldId id="265" r:id="rId18"/>
-    <p:sldId id="266" r:id="rId19"/>
+    <p:sldId id="280" r:id="rId14"/>
+    <p:sldId id="281" r:id="rId15"/>
+    <p:sldId id="264" r:id="rId16"/>
+    <p:sldId id="265" r:id="rId17"/>
+    <p:sldId id="266" r:id="rId18"/>
+    <p:sldId id="283" r:id="rId19"/>
     <p:sldId id="267" r:id="rId20"/>
     <p:sldId id="268" r:id="rId21"/>
     <p:sldId id="269" r:id="rId22"/>
@@ -32,6 +32,7 @@
     <p:sldId id="273" r:id="rId26"/>
     <p:sldId id="274" r:id="rId27"/>
     <p:sldId id="275" r:id="rId28"/>
+    <p:sldId id="284" r:id="rId29"/>
   </p:sldIdLst>
   <p:sldSz cx="9144000" cy="6858000" type="screen4x3"/>
   <p:notesSz cx="6858000" cy="9144000"/>
@@ -132,7 +133,7 @@
   </p:defaultTextStyle>
   <p:extLst>
     <p:ext uri="{EFAFB233-063F-42B5-8137-9DF3F51BA10A}">
-      <p15:sldGuideLst xmlns="" xmlns:p15="http://schemas.microsoft.com/office/powerpoint/2012/main">
+      <p15:sldGuideLst xmlns:p15="http://schemas.microsoft.com/office/powerpoint/2012/main" xmlns="">
         <p15:guide id="1" orient="horz" pos="2160">
           <p15:clr>
             <a:srgbClr val="A4A3A4"/>
@@ -208,7 +209,7 @@
           <a:p>
             <a:fld id="{B6C9204B-584D-48F9-AD68-3D4498C91AF3}" type="datetimeFigureOut">
               <a:rPr lang="en-US" smtClean="0"/>
-              <a:t>12/10/2013</a:t>
+              <a:t>12/11/2013</a:t>
             </a:fld>
             <a:endParaRPr lang="en-US"/>
           </a:p>
@@ -524,7 +525,7 @@
           <a:p>
             <a:fld id="{B6C9204B-584D-48F9-AD68-3D4498C91AF3}" type="datetimeFigureOut">
               <a:rPr lang="en-US" smtClean="0"/>
-              <a:t>12/10/2013</a:t>
+              <a:t>12/11/2013</a:t>
             </a:fld>
             <a:endParaRPr lang="en-US"/>
           </a:p>
@@ -699,7 +700,7 @@
           <a:p>
             <a:fld id="{B6C9204B-584D-48F9-AD68-3D4498C91AF3}" type="datetimeFigureOut">
               <a:rPr lang="en-US" smtClean="0"/>
-              <a:t>12/10/2013</a:t>
+              <a:t>12/11/2013</a:t>
             </a:fld>
             <a:endParaRPr lang="en-US"/>
           </a:p>
@@ -817,7 +818,7 @@
           <a:p>
             <a:fld id="{B6C9204B-584D-48F9-AD68-3D4498C91AF3}" type="datetimeFigureOut">
               <a:rPr lang="en-US" smtClean="0"/>
-              <a:t>12/10/2013</a:t>
+              <a:t>12/11/2013</a:t>
             </a:fld>
             <a:endParaRPr lang="en-US"/>
           </a:p>
@@ -1115,7 +1116,7 @@
           <a:p>
             <a:fld id="{B6C9204B-584D-48F9-AD68-3D4498C91AF3}" type="datetimeFigureOut">
               <a:rPr lang="en-US" smtClean="0"/>
-              <a:t>12/10/2013</a:t>
+              <a:t>12/11/2013</a:t>
             </a:fld>
             <a:endParaRPr lang="en-US"/>
           </a:p>
@@ -1408,7 +1409,7 @@
           <a:p>
             <a:fld id="{B6C9204B-584D-48F9-AD68-3D4498C91AF3}" type="datetimeFigureOut">
               <a:rPr lang="en-US" smtClean="0"/>
-              <a:t>12/10/2013</a:t>
+              <a:t>12/11/2013</a:t>
             </a:fld>
             <a:endParaRPr lang="en-US"/>
           </a:p>
@@ -1836,7 +1837,7 @@
           <a:p>
             <a:fld id="{B6C9204B-584D-48F9-AD68-3D4498C91AF3}" type="datetimeFigureOut">
               <a:rPr lang="en-US" smtClean="0"/>
-              <a:t>12/10/2013</a:t>
+              <a:t>12/11/2013</a:t>
             </a:fld>
             <a:endParaRPr lang="en-US"/>
           </a:p>
@@ -1954,7 +1955,7 @@
           <a:p>
             <a:fld id="{B6C9204B-584D-48F9-AD68-3D4498C91AF3}" type="datetimeFigureOut">
               <a:rPr lang="en-US" smtClean="0"/>
-              <a:t>12/10/2013</a:t>
+              <a:t>12/11/2013</a:t>
             </a:fld>
             <a:endParaRPr lang="en-US"/>
           </a:p>
@@ -2044,7 +2045,7 @@
           <a:p>
             <a:fld id="{B6C9204B-584D-48F9-AD68-3D4498C91AF3}" type="datetimeFigureOut">
               <a:rPr lang="en-US" smtClean="0"/>
-              <a:t>12/10/2013</a:t>
+              <a:t>12/11/2013</a:t>
             </a:fld>
             <a:endParaRPr lang="en-US"/>
           </a:p>
@@ -2294,7 +2295,7 @@
           <a:p>
             <a:fld id="{B6C9204B-584D-48F9-AD68-3D4498C91AF3}" type="datetimeFigureOut">
               <a:rPr lang="en-US" smtClean="0"/>
-              <a:t>12/10/2013</a:t>
+              <a:t>12/11/2013</a:t>
             </a:fld>
             <a:endParaRPr lang="en-US"/>
           </a:p>
@@ -2810,7 +2811,7 @@
           <a:p>
             <a:fld id="{B6C9204B-584D-48F9-AD68-3D4498C91AF3}" type="datetimeFigureOut">
               <a:rPr lang="en-US" smtClean="0"/>
-              <a:t>12/10/2013</a:t>
+              <a:t>12/11/2013</a:t>
             </a:fld>
             <a:endParaRPr lang="en-US"/>
           </a:p>
@@ -3040,7 +3041,7 @@
           <a:p>
             <a:fld id="{B6C9204B-584D-48F9-AD68-3D4498C91AF3}" type="datetimeFigureOut">
               <a:rPr lang="en-US" smtClean="0"/>
-              <a:t>12/10/2013</a:t>
+              <a:t>12/11/2013</a:t>
             </a:fld>
             <a:endParaRPr lang="en-US"/>
           </a:p>
@@ -3807,13 +3808,14 @@
           </a:p>
           <a:p>
             <a:r>
-              <a:rPr lang="en-US" dirty="0" smtClean="0">
-                <a:solidFill>
-                  <a:srgbClr val="FF0000"/>
-                </a:solidFill>
-              </a:rPr>
-              <a:t>[IDE used for coding]</a:t>
-            </a:r>
+              <a:rPr lang="en-US" dirty="0" err="1" smtClean="0"/>
+              <a:t>AVRdude</a:t>
+            </a:r>
+            <a:r>
+              <a:rPr lang="en-US" dirty="0" smtClean="0"/>
+              <a:t> for coding</a:t>
+            </a:r>
+            <a:endParaRPr lang="en-US" dirty="0" smtClean="0"/>
           </a:p>
         </p:txBody>
       </p:sp>
@@ -3896,13 +3898,8 @@
           <a:p>
             <a:r>
               <a:rPr lang="en-US" dirty="0" smtClean="0"/>
-              <a:t>The board layout was sent to OSH Park for </a:t>
-            </a:r>
-            <a:r>
-              <a:rPr lang="en-US" dirty="0" smtClean="0"/>
-              <a:t>fabrication using their design rules</a:t>
-            </a:r>
-            <a:endParaRPr lang="en-US" dirty="0" smtClean="0"/>
+              <a:t>The board layout was sent to OSH Park for fabrication using their design rules</a:t>
+            </a:r>
           </a:p>
           <a:p>
             <a:r>
@@ -4095,84 +4092,25 @@
           <a:p>
             <a:r>
               <a:rPr lang="en-US" dirty="0" smtClean="0"/>
-              <a:t>Design: Power Management</a:t>
+              <a:t>Design: Microcontroller</a:t>
             </a:r>
             <a:endParaRPr lang="en-US" dirty="0"/>
           </a:p>
         </p:txBody>
       </p:sp>
-      <p:pic>
-        <p:nvPicPr>
-          <p:cNvPr id="1026" name="Picture 2"/>
-          <p:cNvPicPr>
-            <a:picLocks noChangeAspect="1" noChangeArrowheads="1"/>
-          </p:cNvPicPr>
-          <p:nvPr/>
-        </p:nvPicPr>
-        <p:blipFill rotWithShape="1">
-          <a:blip r:embed="rId2">
-            <a:extLst>
-              <a:ext uri="{28A0092B-C50C-407E-A947-70E740481C1C}">
-                <a14:useLocalDpi xmlns:a14="http://schemas.microsoft.com/office/drawing/2010/main" val="0"/>
-              </a:ext>
-            </a:extLst>
-          </a:blip>
-          <a:srcRect l="1266" t="1583"/>
-          <a:stretch/>
-        </p:blipFill>
-        <p:spPr bwMode="auto">
-          <a:xfrm>
-            <a:off x="812800" y="1588655"/>
-            <a:ext cx="7205322" cy="4021570"/>
-          </a:xfrm>
-          <a:prstGeom prst="rect">
-            <a:avLst/>
-          </a:prstGeom>
-          <a:noFill/>
-          <a:ln>
-            <a:noFill/>
-          </a:ln>
-          <a:extLst>
-            <a:ext uri="{909E8E84-426E-40DD-AFC4-6F175D3DCCD1}">
-              <a14:hiddenFill xmlns:a14="http://schemas.microsoft.com/office/drawing/2010/main">
-                <a:solidFill>
-                  <a:schemeClr val="accent1"/>
-                </a:solidFill>
-              </a14:hiddenFill>
-            </a:ext>
-            <a:ext uri="{91240B29-F687-4F45-9708-019B960494DF}">
-              <a14:hiddenLine xmlns:a14="http://schemas.microsoft.com/office/drawing/2010/main" w="9525">
-                <a:solidFill>
-                  <a:schemeClr val="tx1"/>
-                </a:solidFill>
-                <a:miter lim="800000"/>
-                <a:headEnd/>
-                <a:tailEnd/>
-              </a14:hiddenLine>
-            </a:ext>
-          </a:extLst>
-        </p:spPr>
-      </p:pic>
-      <p:sp>
-        <p:nvSpPr>
-          <p:cNvPr id="4" name="TextBox 3"/>
-          <p:cNvSpPr txBox="1"/>
-          <p:nvPr/>
-        </p:nvSpPr>
-        <p:spPr>
-          <a:xfrm>
-            <a:off x="990600" y="5867400"/>
-            <a:ext cx="7027522" cy="369332"/>
-          </a:xfrm>
-          <a:prstGeom prst="rect">
-            <a:avLst/>
-          </a:prstGeom>
-          <a:noFill/>
-        </p:spPr>
-        <p:txBody>
-          <a:bodyPr wrap="square" rtlCol="0">
-            <a:spAutoFit/>
-          </a:bodyPr>
+      <p:sp>
+        <p:nvSpPr>
+          <p:cNvPr id="3" name="Content Placeholder 2"/>
+          <p:cNvSpPr>
+            <a:spLocks noGrp="1"/>
+          </p:cNvSpPr>
+          <p:nvPr>
+            <p:ph sz="quarter" idx="13"/>
+          </p:nvPr>
+        </p:nvSpPr>
+        <p:spPr/>
+        <p:txBody>
+          <a:bodyPr/>
           <a:lstStyle/>
           <a:p>
             <a:r>
@@ -4181,7 +4119,7 @@
                   <a:srgbClr val="FF0000"/>
                 </a:solidFill>
               </a:rPr>
-              <a:t>[I may remove this slide later]</a:t>
+              <a:t>[add uC design diagram from HW once signals are more descriptive]</a:t>
             </a:r>
             <a:endParaRPr lang="en-US" dirty="0">
               <a:solidFill>
@@ -4194,7 +4132,7 @@
     </p:spTree>
     <p:extLst>
       <p:ext uri="{BB962C8B-B14F-4D97-AF65-F5344CB8AC3E}">
-        <p14:creationId xmlns:p14="http://schemas.microsoft.com/office/powerpoint/2010/main" val="3054172959"/>
+        <p14:creationId xmlns:p14="http://schemas.microsoft.com/office/powerpoint/2010/main" val="4178376558"/>
       </p:ext>
     </p:extLst>
   </p:cSld>
@@ -4245,9 +4183,13 @@
           <a:p>
             <a:r>
               <a:rPr lang="en-US" dirty="0" smtClean="0"/>
-              <a:t>Design: Microcontroller</a:t>
-            </a:r>
-            <a:endParaRPr lang="en-US" dirty="0"/>
+              <a:t>Design</a:t>
+            </a:r>
+            <a:r>
+              <a:rPr lang="en-US" smtClean="0"/>
+              <a:t>: Coding</a:t>
+            </a:r>
+            <a:endParaRPr lang="en-US"/>
           </a:p>
         </p:txBody>
       </p:sp>
@@ -4266,26 +4208,14 @@
           <a:bodyPr/>
           <a:lstStyle/>
           <a:p>
-            <a:r>
-              <a:rPr lang="en-US" dirty="0" smtClean="0">
-                <a:solidFill>
-                  <a:srgbClr val="FF0000"/>
-                </a:solidFill>
-              </a:rPr>
-              <a:t>[add uC design diagram from HW once signals are more descriptive]</a:t>
-            </a:r>
-            <a:endParaRPr lang="en-US" dirty="0">
-              <a:solidFill>
-                <a:srgbClr val="FF0000"/>
-              </a:solidFill>
-            </a:endParaRPr>
+            <a:endParaRPr lang="en-US"/>
           </a:p>
         </p:txBody>
       </p:sp>
     </p:spTree>
     <p:extLst>
       <p:ext uri="{BB962C8B-B14F-4D97-AF65-F5344CB8AC3E}">
-        <p14:creationId xmlns:p14="http://schemas.microsoft.com/office/powerpoint/2010/main" val="4178376558"/>
+        <p14:creationId xmlns:p14="http://schemas.microsoft.com/office/powerpoint/2010/main" val="2125910615"/>
       </p:ext>
     </p:extLst>
   </p:cSld>
@@ -4336,13 +4266,9 @@
           <a:p>
             <a:r>
               <a:rPr lang="en-US" dirty="0" smtClean="0"/>
-              <a:t>Design</a:t>
-            </a:r>
-            <a:r>
-              <a:rPr lang="en-US" smtClean="0"/>
-              <a:t>: Coding</a:t>
-            </a:r>
-            <a:endParaRPr lang="en-US"/>
+              <a:t>Implementation</a:t>
+            </a:r>
+            <a:endParaRPr lang="en-US" dirty="0"/>
           </a:p>
         </p:txBody>
       </p:sp>
@@ -4358,17 +4284,86 @@
         </p:nvSpPr>
         <p:spPr/>
         <p:txBody>
-          <a:bodyPr/>
-          <a:lstStyle/>
-          <a:p>
-            <a:endParaRPr lang="en-US"/>
+          <a:bodyPr>
+            <a:normAutofit/>
+          </a:bodyPr>
+          <a:lstStyle/>
+          <a:p>
+            <a:r>
+              <a:rPr lang="en-US" dirty="0" smtClean="0"/>
+              <a:t>Board Layout: Eagle CAD Implemented</a:t>
+            </a:r>
+          </a:p>
+          <a:p>
+            <a:pPr lvl="1"/>
+            <a:r>
+              <a:rPr lang="en-US" dirty="0" smtClean="0"/>
+              <a:t>Pin 1 Convention top left</a:t>
+            </a:r>
+          </a:p>
+          <a:p>
+            <a:pPr lvl="1"/>
+            <a:r>
+              <a:rPr lang="en-US" dirty="0" smtClean="0"/>
+              <a:t>Caps as close as possible to ICs</a:t>
+            </a:r>
+          </a:p>
+          <a:p>
+            <a:pPr lvl="1"/>
+            <a:r>
+              <a:rPr lang="el-GR" dirty="0"/>
+              <a:t>μ</a:t>
+            </a:r>
+            <a:r>
+              <a:rPr lang="en-US" dirty="0" smtClean="0"/>
+              <a:t>C centered for space management</a:t>
+            </a:r>
+          </a:p>
+          <a:p>
+            <a:pPr lvl="1"/>
+            <a:r>
+              <a:rPr lang="en-US" dirty="0" smtClean="0"/>
+              <a:t>Large power lines</a:t>
+            </a:r>
+          </a:p>
+          <a:p>
+            <a:pPr lvl="1"/>
+            <a:r>
+              <a:rPr lang="en-US" dirty="0" smtClean="0"/>
+              <a:t>Signal Lines Rx, Tx same length</a:t>
+            </a:r>
+          </a:p>
+          <a:p>
+            <a:pPr lvl="1"/>
+            <a:r>
+              <a:rPr lang="en-US" dirty="0" smtClean="0"/>
+              <a:t>LCD header centric</a:t>
+            </a:r>
+          </a:p>
+          <a:p>
+            <a:pPr lvl="1"/>
+            <a:r>
+              <a:rPr lang="en-US" dirty="0" smtClean="0"/>
+              <a:t>Test points and vias for all GPIOs (modifiable)</a:t>
+            </a:r>
+          </a:p>
+          <a:p>
+            <a:pPr lvl="1"/>
+            <a:r>
+              <a:rPr lang="en-US" dirty="0" smtClean="0"/>
+              <a:t>Magnetometer headers “Isolated” from noise</a:t>
+            </a:r>
+          </a:p>
+          <a:p>
+            <a:pPr lvl="1"/>
+            <a:endParaRPr lang="en-US" dirty="0"/>
           </a:p>
         </p:txBody>
       </p:sp>
     </p:spTree>
     <p:extLst>
       <p:ext uri="{BB962C8B-B14F-4D97-AF65-F5344CB8AC3E}">
-        <p14:creationId xmlns:p14="http://schemas.microsoft.com/office/powerpoint/2010/main" val="2125910615"/>
+        <p14:creationId xmlns:p14="http://schemas.microsoft.com/office/powerpoint/2010/main" val="2443624474"/>
       </p:ext>
     </p:extLst>
   </p:cSld>
@@ -4419,7 +4414,7 @@
           <a:p>
             <a:r>
               <a:rPr lang="en-US" dirty="0" smtClean="0"/>
-              <a:t>Implementation</a:t>
+              <a:t>IP/Prior Work</a:t>
             </a:r>
             <a:endParaRPr lang="en-US" dirty="0"/>
           </a:p>
@@ -4437,78 +4432,25 @@
         </p:nvSpPr>
         <p:spPr/>
         <p:txBody>
-          <a:bodyPr>
-            <a:normAutofit/>
-          </a:bodyPr>
-          <a:lstStyle/>
-          <a:p>
-            <a:r>
-              <a:rPr lang="en-US" dirty="0" smtClean="0"/>
-              <a:t>Board Layout: Eagle CAD Implemented</a:t>
-            </a:r>
-          </a:p>
-          <a:p>
-            <a:pPr lvl="1"/>
-            <a:r>
-              <a:rPr lang="en-US" dirty="0" smtClean="0"/>
-              <a:t>Pin 1 Convention top left</a:t>
-            </a:r>
-          </a:p>
-          <a:p>
-            <a:pPr lvl="1"/>
-            <a:r>
-              <a:rPr lang="en-US" dirty="0" smtClean="0"/>
-              <a:t>Caps as close as possible to ICs</a:t>
-            </a:r>
-          </a:p>
-          <a:p>
-            <a:pPr lvl="1"/>
-            <a:r>
-              <a:rPr lang="el-GR" dirty="0"/>
-              <a:t>μ</a:t>
-            </a:r>
-            <a:r>
-              <a:rPr lang="en-US" dirty="0" smtClean="0"/>
-              <a:t>C centered for space management</a:t>
-            </a:r>
-          </a:p>
-          <a:p>
-            <a:pPr lvl="1"/>
-            <a:r>
-              <a:rPr lang="en-US" dirty="0" smtClean="0"/>
-              <a:t>Large power lines</a:t>
-            </a:r>
-          </a:p>
-          <a:p>
-            <a:pPr lvl="1"/>
-            <a:r>
-              <a:rPr lang="en-US" dirty="0" smtClean="0"/>
-              <a:t>Signal Lines Rx, Tx same length</a:t>
-            </a:r>
-          </a:p>
-          <a:p>
-            <a:pPr lvl="1"/>
-            <a:r>
-              <a:rPr lang="en-US" dirty="0" smtClean="0"/>
-              <a:t>LCD header centric</a:t>
-            </a:r>
-          </a:p>
-          <a:p>
-            <a:pPr lvl="1"/>
-            <a:r>
-              <a:rPr lang="en-US" dirty="0" smtClean="0"/>
-              <a:t>Test points and vias for all GPIOs (modifiable)</a:t>
-            </a:r>
-          </a:p>
-          <a:p>
-            <a:pPr lvl="1"/>
-            <a:r>
-              <a:rPr lang="en-US" dirty="0" smtClean="0"/>
-              <a:t>Magnetometer headers “Isolated” from noise</a:t>
-            </a:r>
-          </a:p>
-          <a:p>
-            <a:pPr lvl="1"/>
+          <a:bodyPr/>
+          <a:lstStyle/>
+          <a:p>
+            <a:r>
+              <a:rPr lang="en-US" dirty="0" smtClean="0"/>
+              <a:t>We utilized the LCD and Magnetometer  Development Boards.</a:t>
+            </a:r>
+          </a:p>
+          <a:p>
+            <a:r>
+              <a:rPr lang="en-US" dirty="0" smtClean="0"/>
+              <a:t>Implementing these COTS Items cost an extra $10 per board, and added design, and implementation constraints.  </a:t>
+            </a:r>
+          </a:p>
+          <a:p>
+            <a:r>
+              <a:rPr lang="en-US" dirty="0" smtClean="0"/>
+              <a:t>Saving the time and effort of integrating these components.</a:t>
+            </a:r>
             <a:endParaRPr lang="en-US" dirty="0"/>
           </a:p>
         </p:txBody>
@@ -4516,7 +4458,7 @@
     </p:spTree>
     <p:extLst>
       <p:ext uri="{BB962C8B-B14F-4D97-AF65-F5344CB8AC3E}">
-        <p14:creationId xmlns:p14="http://schemas.microsoft.com/office/powerpoint/2010/main" val="2443624474"/>
+        <p14:creationId xmlns:p14="http://schemas.microsoft.com/office/powerpoint/2010/main" val="332616918"/>
       </p:ext>
     </p:extLst>
   </p:cSld>
@@ -4562,12 +4504,14 @@
         </p:nvSpPr>
         <p:spPr/>
         <p:txBody>
-          <a:bodyPr/>
-          <a:lstStyle/>
-          <a:p>
-            <a:r>
-              <a:rPr lang="en-US" dirty="0" smtClean="0"/>
-              <a:t>IP/Prior Work</a:t>
+          <a:bodyPr>
+            <a:normAutofit/>
+          </a:bodyPr>
+          <a:lstStyle/>
+          <a:p>
+            <a:r>
+              <a:rPr lang="en-US" dirty="0" smtClean="0"/>
+              <a:t>Testing</a:t>
             </a:r>
             <a:endParaRPr lang="en-US" dirty="0"/>
           </a:p>
@@ -4585,41 +4529,79 @@
         </p:nvSpPr>
         <p:spPr/>
         <p:txBody>
-          <a:bodyPr/>
-          <a:lstStyle/>
-          <a:p>
-            <a:r>
-              <a:rPr lang="en-US" dirty="0" smtClean="0"/>
-              <a:t>We utilized the LCD and Magnetometer  Development Boards.</a:t>
-            </a:r>
-          </a:p>
-          <a:p>
-            <a:r>
-              <a:rPr lang="en-US" dirty="0" smtClean="0"/>
-              <a:t>Implementing these COTS Items cost an extra </a:t>
-            </a:r>
-            <a:r>
-              <a:rPr lang="en-US" dirty="0" smtClean="0"/>
-              <a:t>$10 </a:t>
-            </a:r>
-            <a:r>
-              <a:rPr lang="en-US" dirty="0" smtClean="0"/>
-              <a:t>per board, and added design, and implementation constraints.  </a:t>
-            </a:r>
-          </a:p>
-          <a:p>
-            <a:r>
-              <a:rPr lang="en-US" dirty="0" smtClean="0"/>
-              <a:t>Saving the time and effort of integrating these components.</a:t>
-            </a:r>
-            <a:endParaRPr lang="en-US" dirty="0"/>
+          <a:bodyPr>
+            <a:normAutofit/>
+          </a:bodyPr>
+          <a:lstStyle/>
+          <a:p>
+            <a:r>
+              <a:rPr lang="en-US" dirty="0" smtClean="0"/>
+              <a:t>PMIC: </a:t>
+            </a:r>
+          </a:p>
+          <a:p>
+            <a:pPr lvl="1"/>
+            <a:r>
+              <a:rPr lang="en-US" dirty="0"/>
+              <a:t>U</a:t>
+            </a:r>
+            <a:r>
+              <a:rPr lang="en-US" dirty="0" smtClean="0"/>
+              <a:t>se implemented test points for appropriate DC values</a:t>
+            </a:r>
+          </a:p>
+          <a:p>
+            <a:pPr lvl="1"/>
+            <a:r>
+              <a:rPr lang="en-US" dirty="0"/>
+              <a:t>C</a:t>
+            </a:r>
+            <a:r>
+              <a:rPr lang="en-US" dirty="0" smtClean="0"/>
+              <a:t>harge a battery and test its voltage ensuring that PMIC stops charging at correct voltage</a:t>
+            </a:r>
+          </a:p>
+          <a:p>
+            <a:pPr lvl="1"/>
+            <a:r>
+              <a:rPr lang="en-US" dirty="0" smtClean="0"/>
+              <a:t>Check supply voltages to daughterboards</a:t>
+            </a:r>
+          </a:p>
+          <a:p>
+            <a:r>
+              <a:rPr lang="en-US" dirty="0" smtClean="0"/>
+              <a:t>Microcontroller:</a:t>
+            </a:r>
+          </a:p>
+          <a:p>
+            <a:pPr lvl="1"/>
+            <a:r>
+              <a:rPr lang="en-US" dirty="0" smtClean="0"/>
+              <a:t>Connect via USB</a:t>
+            </a:r>
+          </a:p>
+          <a:p>
+            <a:pPr lvl="1"/>
+            <a:r>
+              <a:rPr lang="en-US" dirty="0" smtClean="0"/>
+              <a:t>GPIO’s used for switching power on to LCD and sensor easily verified using a multimeter</a:t>
+            </a:r>
+          </a:p>
+          <a:p>
+            <a:pPr lvl="1"/>
+            <a:r>
+              <a:rPr lang="en-US" dirty="0" smtClean="0"/>
+              <a:t>Calibration verified using known working compass</a:t>
+            </a:r>
+            <a:endParaRPr lang="en-US" dirty="0" smtClean="0"/>
           </a:p>
         </p:txBody>
       </p:sp>
     </p:spTree>
     <p:extLst>
       <p:ext uri="{BB962C8B-B14F-4D97-AF65-F5344CB8AC3E}">
-        <p14:creationId xmlns:p14="http://schemas.microsoft.com/office/powerpoint/2010/main" val="332616918"/>
+        <p14:creationId xmlns:p14="http://schemas.microsoft.com/office/powerpoint/2010/main" val="1751834017"/>
       </p:ext>
     </p:extLst>
   </p:cSld>
@@ -4665,9 +4647,7 @@
         </p:nvSpPr>
         <p:spPr/>
         <p:txBody>
-          <a:bodyPr>
-            <a:normAutofit/>
-          </a:bodyPr>
+          <a:bodyPr/>
           <a:lstStyle/>
           <a:p>
             <a:r>
@@ -4693,14 +4673,73 @@
           <a:bodyPr/>
           <a:lstStyle/>
           <a:p>
-            <a:endParaRPr lang="en-US"/>
+            <a:r>
+              <a:rPr lang="en-US" dirty="0"/>
+              <a:t>LCD:</a:t>
+            </a:r>
+          </a:p>
+          <a:p>
+            <a:pPr lvl="1"/>
+            <a:r>
+              <a:rPr lang="en-US" dirty="0"/>
+              <a:t>Check DC inputs</a:t>
+            </a:r>
+          </a:p>
+          <a:p>
+            <a:pPr lvl="1"/>
+            <a:r>
+              <a:rPr lang="en-US" dirty="0"/>
+              <a:t>View data signals with MSO through test points</a:t>
+            </a:r>
+          </a:p>
+          <a:p>
+            <a:pPr lvl="1"/>
+            <a:r>
+              <a:rPr lang="en-US" dirty="0"/>
+              <a:t>Visually verify text output</a:t>
+            </a:r>
+          </a:p>
+          <a:p>
+            <a:r>
+              <a:rPr lang="en-US" dirty="0"/>
+              <a:t>Magnetometer/</a:t>
+            </a:r>
+            <a:r>
+              <a:rPr lang="en-US" dirty="0" err="1"/>
+              <a:t>Acceleromter</a:t>
+            </a:r>
+            <a:endParaRPr lang="en-US" dirty="0"/>
+          </a:p>
+          <a:p>
+            <a:pPr lvl="1"/>
+            <a:r>
+              <a:rPr lang="en-US" dirty="0"/>
+              <a:t>Check DC inputs</a:t>
+            </a:r>
+          </a:p>
+          <a:p>
+            <a:pPr lvl="1"/>
+            <a:r>
+              <a:rPr lang="en-US" dirty="0"/>
+              <a:t>View data signals with MSO through test points</a:t>
+            </a:r>
+          </a:p>
+          <a:p>
+            <a:pPr lvl="1"/>
+            <a:r>
+              <a:rPr lang="en-US" dirty="0"/>
+              <a:t>Verify output by comparison of values on LCD to known working compass</a:t>
+            </a:r>
+          </a:p>
+          <a:p>
+            <a:endParaRPr lang="en-US" dirty="0"/>
           </a:p>
         </p:txBody>
       </p:sp>
     </p:spTree>
     <p:extLst>
       <p:ext uri="{BB962C8B-B14F-4D97-AF65-F5344CB8AC3E}">
-        <p14:creationId xmlns:p14="http://schemas.microsoft.com/office/powerpoint/2010/main" val="1751834017"/>
+        <p14:creationId xmlns:p14="http://schemas.microsoft.com/office/powerpoint/2010/main" val="933249906"/>
       </p:ext>
     </p:extLst>
   </p:cSld>
@@ -5716,6 +5755,121 @@
 </p:sld>
 </file>
 
+<file path=ppt/slides/slide28.xml><?xml version="1.0" encoding="utf-8"?>
+<p:sld xmlns:a="http://schemas.openxmlformats.org/drawingml/2006/main" xmlns:r="http://schemas.openxmlformats.org/officeDocument/2006/relationships" xmlns:p="http://schemas.openxmlformats.org/presentationml/2006/main">
+  <p:cSld>
+    <p:spTree>
+      <p:nvGrpSpPr>
+        <p:cNvPr id="1" name=""/>
+        <p:cNvGrpSpPr/>
+        <p:nvPr/>
+      </p:nvGrpSpPr>
+      <p:grpSpPr>
+        <a:xfrm>
+          <a:off x="0" y="0"/>
+          <a:ext cx="0" cy="0"/>
+          <a:chOff x="0" y="0"/>
+          <a:chExt cx="0" cy="0"/>
+        </a:xfrm>
+      </p:grpSpPr>
+      <p:sp>
+        <p:nvSpPr>
+          <p:cNvPr id="2" name="Title 1"/>
+          <p:cNvSpPr>
+            <a:spLocks noGrp="1"/>
+          </p:cNvSpPr>
+          <p:nvPr>
+            <p:ph type="title"/>
+          </p:nvPr>
+        </p:nvSpPr>
+        <p:spPr/>
+        <p:txBody>
+          <a:bodyPr/>
+          <a:lstStyle/>
+          <a:p>
+            <a:pPr algn="ctr"/>
+            <a:r>
+              <a:rPr lang="en-US" dirty="0" smtClean="0"/>
+              <a:t>The end</a:t>
+            </a:r>
+            <a:endParaRPr lang="en-US" dirty="0"/>
+          </a:p>
+        </p:txBody>
+      </p:sp>
+      <p:pic>
+        <p:nvPicPr>
+          <p:cNvPr id="1026" name="Picture 2"/>
+          <p:cNvPicPr>
+            <a:picLocks noChangeAspect="1" noChangeArrowheads="1"/>
+          </p:cNvPicPr>
+          <p:nvPr/>
+        </p:nvPicPr>
+        <p:blipFill>
+          <a:blip r:embed="rId2">
+            <a:extLst>
+              <a:ext uri="{28A0092B-C50C-407E-A947-70E740481C1C}">
+                <a14:useLocalDpi xmlns:a14="http://schemas.microsoft.com/office/drawing/2010/main" val="0"/>
+              </a:ext>
+            </a:extLst>
+          </a:blip>
+          <a:srcRect/>
+          <a:stretch>
+            <a:fillRect/>
+          </a:stretch>
+        </p:blipFill>
+        <p:spPr bwMode="auto">
+          <a:xfrm>
+            <a:off x="2176463" y="1624013"/>
+            <a:ext cx="4791075" cy="3609975"/>
+          </a:xfrm>
+          <a:prstGeom prst="rect">
+            <a:avLst/>
+          </a:prstGeom>
+          <a:noFill/>
+          <a:ln>
+            <a:noFill/>
+          </a:ln>
+          <a:extLst>
+            <a:ext uri="{909E8E84-426E-40DD-AFC4-6F175D3DCCD1}">
+              <a14:hiddenFill xmlns:a14="http://schemas.microsoft.com/office/drawing/2010/main">
+                <a:solidFill>
+                  <a:schemeClr val="accent1"/>
+                </a:solidFill>
+              </a14:hiddenFill>
+            </a:ext>
+            <a:ext uri="{91240B29-F687-4F45-9708-019B960494DF}">
+              <a14:hiddenLine xmlns:a14="http://schemas.microsoft.com/office/drawing/2010/main" w="9525">
+                <a:solidFill>
+                  <a:schemeClr val="tx1"/>
+                </a:solidFill>
+                <a:miter lim="800000"/>
+                <a:headEnd/>
+                <a:tailEnd/>
+              </a14:hiddenLine>
+            </a:ext>
+          </a:extLst>
+        </p:spPr>
+      </p:pic>
+    </p:spTree>
+    <p:extLst>
+      <p:ext uri="{BB962C8B-B14F-4D97-AF65-F5344CB8AC3E}">
+        <p14:creationId xmlns:p14="http://schemas.microsoft.com/office/powerpoint/2010/main" val="3444399274"/>
+      </p:ext>
+    </p:extLst>
+  </p:cSld>
+  <p:clrMapOvr>
+    <a:masterClrMapping/>
+  </p:clrMapOvr>
+  <p:timing>
+    <p:tnLst>
+      <p:par>
+        <p:cTn id="1" dur="indefinite" restart="never" nodeType="tmRoot"/>
+      </p:par>
+    </p:tnLst>
+  </p:timing>
+</p:sld>
+</file>
+
 <file path=ppt/slides/slide3.xml><?xml version="1.0" encoding="utf-8"?>
 <p:sld xmlns:a="http://schemas.openxmlformats.org/drawingml/2006/main" xmlns:r="http://schemas.openxmlformats.org/officeDocument/2006/relationships" xmlns:p="http://schemas.openxmlformats.org/presentationml/2006/main">
   <p:cSld>
@@ -6256,24 +6410,32 @@
           <a:p>
             <a:r>
               <a:rPr lang="en-US" dirty="0" smtClean="0"/>
-              <a:t>Display on a LCD a heading either with a compass face or with letters (i.e. “NNW”) as well as a numerical value in degrees</a:t>
-            </a:r>
-          </a:p>
-          <a:p>
-            <a:r>
-              <a:rPr lang="en-US" dirty="0" smtClean="0"/>
-              <a:t>Be prepared for software updates</a:t>
-            </a:r>
-          </a:p>
-          <a:p>
-            <a:r>
-              <a:rPr lang="en-US" dirty="0" smtClean="0">
-                <a:solidFill>
-                  <a:srgbClr val="FF0000"/>
-                </a:solidFill>
-              </a:rPr>
-              <a:t>[backlight??]</a:t>
-            </a:r>
+              <a:t>Output on a display a </a:t>
+            </a:r>
+            <a:r>
+              <a:rPr lang="en-US" dirty="0" smtClean="0"/>
+              <a:t>heading either with a compass face or with letters (i.e. “NNW”) as well as a numerical value in degrees</a:t>
+            </a:r>
+          </a:p>
+          <a:p>
+            <a:r>
+              <a:rPr lang="en-US" dirty="0" smtClean="0"/>
+              <a:t>Be prepared for software </a:t>
+            </a:r>
+            <a:r>
+              <a:rPr lang="en-US" dirty="0" smtClean="0"/>
+              <a:t>updates</a:t>
+            </a:r>
+          </a:p>
+          <a:p>
+            <a:r>
+              <a:rPr lang="en-US" dirty="0" smtClean="0"/>
+              <a:t>Display must have a backlight for use in the dark</a:t>
+            </a:r>
+            <a:endParaRPr lang="en-US" dirty="0"/>
+          </a:p>
+          <a:p>
+            <a:endParaRPr lang="en-US" dirty="0" smtClean="0"/>
           </a:p>
         </p:txBody>
       </p:sp>
@@ -6526,11 +6688,7 @@
           <a:p>
             <a:r>
               <a:rPr lang="en-US" dirty="0" smtClean="0"/>
-              <a:t>Order development boards from SparkFun for initial </a:t>
-            </a:r>
-            <a:r>
-              <a:rPr lang="en-US" dirty="0" smtClean="0"/>
-              <a:t>prototyping</a:t>
+              <a:t>Order development boards from SparkFun for initial prototyping</a:t>
             </a:r>
           </a:p>
           <a:p>
@@ -6538,7 +6696,6 @@
               <a:rPr lang="en-US" dirty="0" smtClean="0"/>
               <a:t>Defining project requirements</a:t>
             </a:r>
-            <a:endParaRPr lang="en-US" dirty="0" smtClean="0"/>
           </a:p>
         </p:txBody>
       </p:sp>

</xml_diff>

<commit_message>
Updated Design model and PPT
</commit_message>
<xml_diff>
--- a/Documentation/Project Documentation/Project Presentation.pptx
+++ b/Documentation/Project Documentation/Project Presentation.pptx
@@ -16,23 +16,26 @@
     <p:sldId id="277" r:id="rId10"/>
     <p:sldId id="278" r:id="rId11"/>
     <p:sldId id="279" r:id="rId12"/>
-    <p:sldId id="282" r:id="rId13"/>
-    <p:sldId id="280" r:id="rId14"/>
-    <p:sldId id="281" r:id="rId15"/>
-    <p:sldId id="264" r:id="rId16"/>
-    <p:sldId id="265" r:id="rId17"/>
-    <p:sldId id="266" r:id="rId18"/>
-    <p:sldId id="283" r:id="rId19"/>
-    <p:sldId id="267" r:id="rId20"/>
-    <p:sldId id="268" r:id="rId21"/>
-    <p:sldId id="269" r:id="rId22"/>
-    <p:sldId id="270" r:id="rId23"/>
-    <p:sldId id="271" r:id="rId24"/>
-    <p:sldId id="272" r:id="rId25"/>
-    <p:sldId id="273" r:id="rId26"/>
-    <p:sldId id="274" r:id="rId27"/>
-    <p:sldId id="275" r:id="rId28"/>
-    <p:sldId id="284" r:id="rId29"/>
+    <p:sldId id="285" r:id="rId13"/>
+    <p:sldId id="286" r:id="rId14"/>
+    <p:sldId id="282" r:id="rId15"/>
+    <p:sldId id="280" r:id="rId16"/>
+    <p:sldId id="287" r:id="rId17"/>
+    <p:sldId id="281" r:id="rId18"/>
+    <p:sldId id="264" r:id="rId19"/>
+    <p:sldId id="265" r:id="rId20"/>
+    <p:sldId id="266" r:id="rId21"/>
+    <p:sldId id="283" r:id="rId22"/>
+    <p:sldId id="267" r:id="rId23"/>
+    <p:sldId id="268" r:id="rId24"/>
+    <p:sldId id="269" r:id="rId25"/>
+    <p:sldId id="270" r:id="rId26"/>
+    <p:sldId id="271" r:id="rId27"/>
+    <p:sldId id="272" r:id="rId28"/>
+    <p:sldId id="273" r:id="rId29"/>
+    <p:sldId id="274" r:id="rId30"/>
+    <p:sldId id="275" r:id="rId31"/>
+    <p:sldId id="284" r:id="rId32"/>
   </p:sldIdLst>
   <p:sldSz cx="9144000" cy="6858000" type="screen4x3"/>
   <p:notesSz cx="6858000" cy="9144000"/>
@@ -133,7 +136,7 @@
   </p:defaultTextStyle>
   <p:extLst>
     <p:ext uri="{EFAFB233-063F-42B5-8137-9DF3F51BA10A}">
-      <p15:sldGuideLst xmlns:p15="http://schemas.microsoft.com/office/powerpoint/2012/main" xmlns="">
+      <p15:sldGuideLst xmlns="" xmlns:p15="http://schemas.microsoft.com/office/powerpoint/2012/main">
         <p15:guide id="1" orient="horz" pos="2160">
           <p15:clr>
             <a:srgbClr val="A4A3A4"/>
@@ -209,7 +212,7 @@
           <a:p>
             <a:fld id="{B6C9204B-584D-48F9-AD68-3D4498C91AF3}" type="datetimeFigureOut">
               <a:rPr lang="en-US" smtClean="0"/>
-              <a:t>12/11/2013</a:t>
+              <a:t>12/12/2013</a:t>
             </a:fld>
             <a:endParaRPr lang="en-US"/>
           </a:p>
@@ -525,7 +528,7 @@
           <a:p>
             <a:fld id="{B6C9204B-584D-48F9-AD68-3D4498C91AF3}" type="datetimeFigureOut">
               <a:rPr lang="en-US" smtClean="0"/>
-              <a:t>12/11/2013</a:t>
+              <a:t>12/12/2013</a:t>
             </a:fld>
             <a:endParaRPr lang="en-US"/>
           </a:p>
@@ -700,7 +703,7 @@
           <a:p>
             <a:fld id="{B6C9204B-584D-48F9-AD68-3D4498C91AF3}" type="datetimeFigureOut">
               <a:rPr lang="en-US" smtClean="0"/>
-              <a:t>12/11/2013</a:t>
+              <a:t>12/12/2013</a:t>
             </a:fld>
             <a:endParaRPr lang="en-US"/>
           </a:p>
@@ -818,7 +821,7 @@
           <a:p>
             <a:fld id="{B6C9204B-584D-48F9-AD68-3D4498C91AF3}" type="datetimeFigureOut">
               <a:rPr lang="en-US" smtClean="0"/>
-              <a:t>12/11/2013</a:t>
+              <a:t>12/12/2013</a:t>
             </a:fld>
             <a:endParaRPr lang="en-US"/>
           </a:p>
@@ -1116,7 +1119,7 @@
           <a:p>
             <a:fld id="{B6C9204B-584D-48F9-AD68-3D4498C91AF3}" type="datetimeFigureOut">
               <a:rPr lang="en-US" smtClean="0"/>
-              <a:t>12/11/2013</a:t>
+              <a:t>12/12/2013</a:t>
             </a:fld>
             <a:endParaRPr lang="en-US"/>
           </a:p>
@@ -1409,7 +1412,7 @@
           <a:p>
             <a:fld id="{B6C9204B-584D-48F9-AD68-3D4498C91AF3}" type="datetimeFigureOut">
               <a:rPr lang="en-US" smtClean="0"/>
-              <a:t>12/11/2013</a:t>
+              <a:t>12/12/2013</a:t>
             </a:fld>
             <a:endParaRPr lang="en-US"/>
           </a:p>
@@ -1837,7 +1840,7 @@
           <a:p>
             <a:fld id="{B6C9204B-584D-48F9-AD68-3D4498C91AF3}" type="datetimeFigureOut">
               <a:rPr lang="en-US" smtClean="0"/>
-              <a:t>12/11/2013</a:t>
+              <a:t>12/12/2013</a:t>
             </a:fld>
             <a:endParaRPr lang="en-US"/>
           </a:p>
@@ -1955,7 +1958,7 @@
           <a:p>
             <a:fld id="{B6C9204B-584D-48F9-AD68-3D4498C91AF3}" type="datetimeFigureOut">
               <a:rPr lang="en-US" smtClean="0"/>
-              <a:t>12/11/2013</a:t>
+              <a:t>12/12/2013</a:t>
             </a:fld>
             <a:endParaRPr lang="en-US"/>
           </a:p>
@@ -2045,7 +2048,7 @@
           <a:p>
             <a:fld id="{B6C9204B-584D-48F9-AD68-3D4498C91AF3}" type="datetimeFigureOut">
               <a:rPr lang="en-US" smtClean="0"/>
-              <a:t>12/11/2013</a:t>
+              <a:t>12/12/2013</a:t>
             </a:fld>
             <a:endParaRPr lang="en-US"/>
           </a:p>
@@ -2295,7 +2298,7 @@
           <a:p>
             <a:fld id="{B6C9204B-584D-48F9-AD68-3D4498C91AF3}" type="datetimeFigureOut">
               <a:rPr lang="en-US" smtClean="0"/>
-              <a:t>12/11/2013</a:t>
+              <a:t>12/12/2013</a:t>
             </a:fld>
             <a:endParaRPr lang="en-US"/>
           </a:p>
@@ -2811,7 +2814,7 @@
           <a:p>
             <a:fld id="{B6C9204B-584D-48F9-AD68-3D4498C91AF3}" type="datetimeFigureOut">
               <a:rPr lang="en-US" smtClean="0"/>
-              <a:t>12/11/2013</a:t>
+              <a:t>12/12/2013</a:t>
             </a:fld>
             <a:endParaRPr lang="en-US"/>
           </a:p>
@@ -3041,7 +3044,7 @@
           <a:p>
             <a:fld id="{B6C9204B-584D-48F9-AD68-3D4498C91AF3}" type="datetimeFigureOut">
               <a:rPr lang="en-US" smtClean="0"/>
-              <a:t>12/11/2013</a:t>
+              <a:t>12/12/2013</a:t>
             </a:fld>
             <a:endParaRPr lang="en-US"/>
           </a:p>
@@ -3781,12 +3784,28 @@
           </a:bodyPr>
           <a:lstStyle/>
           <a:p>
+            <a:pPr>
+              <a:spcBef>
+                <a:spcPts val="1200"/>
+              </a:spcBef>
+              <a:spcAft>
+                <a:spcPts val="1200"/>
+              </a:spcAft>
+            </a:pPr>
             <a:r>
               <a:rPr lang="en-US" dirty="0" smtClean="0"/>
               <a:t>Application notes for the major components were considered</a:t>
             </a:r>
           </a:p>
           <a:p>
+            <a:pPr>
+              <a:spcBef>
+                <a:spcPts val="1200"/>
+              </a:spcBef>
+              <a:spcAft>
+                <a:spcPts val="1200"/>
+              </a:spcAft>
+            </a:pPr>
             <a:r>
               <a:rPr lang="en-US" dirty="0" smtClean="0"/>
               <a:t>Decided to only implement </a:t>
@@ -3801,21 +3820,32 @@
             </a:r>
           </a:p>
           <a:p>
+            <a:pPr>
+              <a:spcBef>
+                <a:spcPts val="1200"/>
+              </a:spcBef>
+              <a:spcAft>
+                <a:spcPts val="1200"/>
+              </a:spcAft>
+            </a:pPr>
             <a:r>
               <a:rPr lang="en-US" dirty="0" smtClean="0"/>
               <a:t>EAGLE CAD software used for schematic and layout</a:t>
             </a:r>
           </a:p>
           <a:p>
-            <a:r>
-              <a:rPr lang="en-US" dirty="0" err="1" smtClean="0"/>
-              <a:t>AVRdude</a:t>
-            </a:r>
-            <a:r>
-              <a:rPr lang="en-US" dirty="0" smtClean="0"/>
-              <a:t> for coding</a:t>
-            </a:r>
-            <a:endParaRPr lang="en-US" dirty="0" smtClean="0"/>
+            <a:pPr>
+              <a:spcBef>
+                <a:spcPts val="1200"/>
+              </a:spcBef>
+              <a:spcAft>
+                <a:spcPts val="1200"/>
+              </a:spcAft>
+            </a:pPr>
+            <a:r>
+              <a:rPr lang="en-US" dirty="0" smtClean="0"/>
+              <a:t>AVRdude for coding</a:t>
+            </a:r>
           </a:p>
         </p:txBody>
       </p:sp>
@@ -3896,24 +3926,56 @@
           </a:bodyPr>
           <a:lstStyle/>
           <a:p>
+            <a:pPr>
+              <a:spcBef>
+                <a:spcPts val="1200"/>
+              </a:spcBef>
+              <a:spcAft>
+                <a:spcPts val="1200"/>
+              </a:spcAft>
+            </a:pPr>
             <a:r>
               <a:rPr lang="en-US" dirty="0" smtClean="0"/>
               <a:t>The board layout was sent to OSH Park for fabrication using their design rules</a:t>
             </a:r>
           </a:p>
           <a:p>
+            <a:pPr>
+              <a:spcBef>
+                <a:spcPts val="1200"/>
+              </a:spcBef>
+              <a:spcAft>
+                <a:spcPts val="1200"/>
+              </a:spcAft>
+            </a:pPr>
             <a:r>
               <a:rPr lang="en-US" dirty="0" smtClean="0"/>
               <a:t>Two of our major components, Atmega32u4 and LTC4067 came in packages that were not hand solder-able</a:t>
             </a:r>
           </a:p>
           <a:p>
+            <a:pPr>
+              <a:spcBef>
+                <a:spcPts val="1200"/>
+              </a:spcBef>
+              <a:spcAft>
+                <a:spcPts val="1200"/>
+              </a:spcAft>
+            </a:pPr>
             <a:r>
               <a:rPr lang="en-US" dirty="0" smtClean="0"/>
               <a:t>The ATmega32u4 chip that we used came in a QFN package,  and the LTC4067 was in a DFN package</a:t>
             </a:r>
           </a:p>
           <a:p>
+            <a:pPr>
+              <a:spcBef>
+                <a:spcPts val="1200"/>
+              </a:spcBef>
+              <a:spcAft>
+                <a:spcPts val="1200"/>
+              </a:spcAft>
+            </a:pPr>
             <a:r>
               <a:rPr lang="en-US" dirty="0" smtClean="0"/>
               <a:t>Due to the components that could not be soldered by hand, the reflow oven in the EPL was used for construction</a:t>
@@ -3945,6 +4007,220 @@
 </file>
 
 <file path=ppt/slides/slide12.xml><?xml version="1.0" encoding="utf-8"?>
+<p:sld xmlns:a="http://schemas.openxmlformats.org/drawingml/2006/main" xmlns:r="http://schemas.openxmlformats.org/officeDocument/2006/relationships" xmlns:p="http://schemas.openxmlformats.org/presentationml/2006/main">
+  <p:cSld>
+    <p:spTree>
+      <p:nvGrpSpPr>
+        <p:cNvPr id="1" name=""/>
+        <p:cNvGrpSpPr/>
+        <p:nvPr/>
+      </p:nvGrpSpPr>
+      <p:grpSpPr>
+        <a:xfrm>
+          <a:off x="0" y="0"/>
+          <a:ext cx="0" cy="0"/>
+          <a:chOff x="0" y="0"/>
+          <a:chExt cx="0" cy="0"/>
+        </a:xfrm>
+      </p:grpSpPr>
+      <p:sp>
+        <p:nvSpPr>
+          <p:cNvPr id="2" name="Title 1"/>
+          <p:cNvSpPr>
+            <a:spLocks noGrp="1"/>
+          </p:cNvSpPr>
+          <p:nvPr>
+            <p:ph type="title"/>
+          </p:nvPr>
+        </p:nvSpPr>
+        <p:spPr/>
+        <p:txBody>
+          <a:bodyPr/>
+          <a:lstStyle/>
+          <a:p>
+            <a:r>
+              <a:rPr lang="en-US" dirty="0" smtClean="0"/>
+              <a:t>Design: System level 0</a:t>
+            </a:r>
+            <a:endParaRPr lang="en-US" dirty="0"/>
+          </a:p>
+        </p:txBody>
+      </p:sp>
+      <p:pic>
+        <p:nvPicPr>
+          <p:cNvPr id="1028" name="Picture 4"/>
+          <p:cNvPicPr>
+            <a:picLocks noChangeAspect="1" noChangeArrowheads="1"/>
+          </p:cNvPicPr>
+          <p:nvPr/>
+        </p:nvPicPr>
+        <p:blipFill>
+          <a:blip r:embed="rId2">
+            <a:extLst>
+              <a:ext uri="{28A0092B-C50C-407E-A947-70E740481C1C}">
+                <a14:useLocalDpi xmlns:a14="http://schemas.microsoft.com/office/drawing/2010/main" val="0"/>
+              </a:ext>
+            </a:extLst>
+          </a:blip>
+          <a:srcRect/>
+          <a:stretch>
+            <a:fillRect/>
+          </a:stretch>
+        </p:blipFill>
+        <p:spPr bwMode="auto">
+          <a:xfrm>
+            <a:off x="1447800" y="1524000"/>
+            <a:ext cx="6096000" cy="4953000"/>
+          </a:xfrm>
+          <a:prstGeom prst="rect">
+            <a:avLst/>
+          </a:prstGeom>
+          <a:noFill/>
+          <a:ln>
+            <a:noFill/>
+          </a:ln>
+          <a:extLst>
+            <a:ext uri="{909E8E84-426E-40DD-AFC4-6F175D3DCCD1}">
+              <a14:hiddenFill xmlns:a14="http://schemas.microsoft.com/office/drawing/2010/main">
+                <a:solidFill>
+                  <a:schemeClr val="accent1"/>
+                </a:solidFill>
+              </a14:hiddenFill>
+            </a:ext>
+            <a:ext uri="{91240B29-F687-4F45-9708-019B960494DF}">
+              <a14:hiddenLine xmlns:a14="http://schemas.microsoft.com/office/drawing/2010/main" w="9525">
+                <a:solidFill>
+                  <a:schemeClr val="tx1"/>
+                </a:solidFill>
+                <a:miter lim="800000"/>
+                <a:headEnd/>
+                <a:tailEnd/>
+              </a14:hiddenLine>
+            </a:ext>
+          </a:extLst>
+        </p:spPr>
+      </p:pic>
+    </p:spTree>
+    <p:extLst>
+      <p:ext uri="{BB962C8B-B14F-4D97-AF65-F5344CB8AC3E}">
+        <p14:creationId xmlns:p14="http://schemas.microsoft.com/office/powerpoint/2010/main" val="110121228"/>
+      </p:ext>
+    </p:extLst>
+  </p:cSld>
+  <p:clrMapOvr>
+    <a:masterClrMapping/>
+  </p:clrMapOvr>
+</p:sld>
+</file>
+
+<file path=ppt/slides/slide13.xml><?xml version="1.0" encoding="utf-8"?>
+<p:sld xmlns:a="http://schemas.openxmlformats.org/drawingml/2006/main" xmlns:r="http://schemas.openxmlformats.org/officeDocument/2006/relationships" xmlns:p="http://schemas.openxmlformats.org/presentationml/2006/main">
+  <p:cSld>
+    <p:spTree>
+      <p:nvGrpSpPr>
+        <p:cNvPr id="1" name=""/>
+        <p:cNvGrpSpPr/>
+        <p:nvPr/>
+      </p:nvGrpSpPr>
+      <p:grpSpPr>
+        <a:xfrm>
+          <a:off x="0" y="0"/>
+          <a:ext cx="0" cy="0"/>
+          <a:chOff x="0" y="0"/>
+          <a:chExt cx="0" cy="0"/>
+        </a:xfrm>
+      </p:grpSpPr>
+      <p:sp>
+        <p:nvSpPr>
+          <p:cNvPr id="2" name="Title 1"/>
+          <p:cNvSpPr>
+            <a:spLocks noGrp="1"/>
+          </p:cNvSpPr>
+          <p:nvPr>
+            <p:ph type="title"/>
+          </p:nvPr>
+        </p:nvSpPr>
+        <p:spPr/>
+        <p:txBody>
+          <a:bodyPr/>
+          <a:lstStyle/>
+          <a:p>
+            <a:r>
+              <a:rPr lang="en-US" dirty="0" smtClean="0"/>
+              <a:t>Design: level 1</a:t>
+            </a:r>
+            <a:endParaRPr lang="en-US" dirty="0"/>
+          </a:p>
+        </p:txBody>
+      </p:sp>
+      <p:pic>
+        <p:nvPicPr>
+          <p:cNvPr id="2052" name="Picture 4"/>
+          <p:cNvPicPr>
+            <a:picLocks noChangeAspect="1" noChangeArrowheads="1"/>
+          </p:cNvPicPr>
+          <p:nvPr/>
+        </p:nvPicPr>
+        <p:blipFill>
+          <a:blip r:embed="rId2">
+            <a:extLst>
+              <a:ext uri="{28A0092B-C50C-407E-A947-70E740481C1C}">
+                <a14:useLocalDpi xmlns:a14="http://schemas.microsoft.com/office/drawing/2010/main" val="0"/>
+              </a:ext>
+            </a:extLst>
+          </a:blip>
+          <a:srcRect/>
+          <a:stretch>
+            <a:fillRect/>
+          </a:stretch>
+        </p:blipFill>
+        <p:spPr bwMode="auto">
+          <a:xfrm>
+            <a:off x="2147888" y="1509713"/>
+            <a:ext cx="4848225" cy="3838575"/>
+          </a:xfrm>
+          <a:prstGeom prst="rect">
+            <a:avLst/>
+          </a:prstGeom>
+          <a:noFill/>
+          <a:ln>
+            <a:noFill/>
+          </a:ln>
+          <a:extLst>
+            <a:ext uri="{909E8E84-426E-40DD-AFC4-6F175D3DCCD1}">
+              <a14:hiddenFill xmlns:a14="http://schemas.microsoft.com/office/drawing/2010/main">
+                <a:solidFill>
+                  <a:schemeClr val="accent1"/>
+                </a:solidFill>
+              </a14:hiddenFill>
+            </a:ext>
+            <a:ext uri="{91240B29-F687-4F45-9708-019B960494DF}">
+              <a14:hiddenLine xmlns:a14="http://schemas.microsoft.com/office/drawing/2010/main" w="9525">
+                <a:solidFill>
+                  <a:schemeClr val="tx1"/>
+                </a:solidFill>
+                <a:miter lim="800000"/>
+                <a:headEnd/>
+                <a:tailEnd/>
+              </a14:hiddenLine>
+            </a:ext>
+          </a:extLst>
+        </p:spPr>
+      </p:pic>
+    </p:spTree>
+    <p:extLst>
+      <p:ext uri="{BB962C8B-B14F-4D97-AF65-F5344CB8AC3E}">
+        <p14:creationId xmlns:p14="http://schemas.microsoft.com/office/powerpoint/2010/main" val="172521764"/>
+      </p:ext>
+    </p:extLst>
+  </p:cSld>
+  <p:clrMapOvr>
+    <a:masterClrMapping/>
+  </p:clrMapOvr>
+</p:sld>
+</file>
+
+<file path=ppt/slides/slide14.xml><?xml version="1.0" encoding="utf-8"?>
 <p:sld xmlns:a="http://schemas.openxmlformats.org/drawingml/2006/main" xmlns:r="http://schemas.openxmlformats.org/officeDocument/2006/relationships" xmlns:p="http://schemas.openxmlformats.org/presentationml/2006/main">
   <p:cSld>
     <p:spTree>
@@ -4058,180 +4334,6 @@
 </p:sld>
 </file>
 
-<file path=ppt/slides/slide13.xml><?xml version="1.0" encoding="utf-8"?>
-<p:sld xmlns:a="http://schemas.openxmlformats.org/drawingml/2006/main" xmlns:r="http://schemas.openxmlformats.org/officeDocument/2006/relationships" xmlns:p="http://schemas.openxmlformats.org/presentationml/2006/main">
-  <p:cSld>
-    <p:spTree>
-      <p:nvGrpSpPr>
-        <p:cNvPr id="1" name=""/>
-        <p:cNvGrpSpPr/>
-        <p:nvPr/>
-      </p:nvGrpSpPr>
-      <p:grpSpPr>
-        <a:xfrm>
-          <a:off x="0" y="0"/>
-          <a:ext cx="0" cy="0"/>
-          <a:chOff x="0" y="0"/>
-          <a:chExt cx="0" cy="0"/>
-        </a:xfrm>
-      </p:grpSpPr>
-      <p:sp>
-        <p:nvSpPr>
-          <p:cNvPr id="2" name="Title 1"/>
-          <p:cNvSpPr>
-            <a:spLocks noGrp="1"/>
-          </p:cNvSpPr>
-          <p:nvPr>
-            <p:ph type="title"/>
-          </p:nvPr>
-        </p:nvSpPr>
-        <p:spPr/>
-        <p:txBody>
-          <a:bodyPr/>
-          <a:lstStyle/>
-          <a:p>
-            <a:r>
-              <a:rPr lang="en-US" dirty="0" smtClean="0"/>
-              <a:t>Design: Microcontroller</a:t>
-            </a:r>
-            <a:endParaRPr lang="en-US" dirty="0"/>
-          </a:p>
-        </p:txBody>
-      </p:sp>
-      <p:sp>
-        <p:nvSpPr>
-          <p:cNvPr id="3" name="Content Placeholder 2"/>
-          <p:cNvSpPr>
-            <a:spLocks noGrp="1"/>
-          </p:cNvSpPr>
-          <p:nvPr>
-            <p:ph sz="quarter" idx="13"/>
-          </p:nvPr>
-        </p:nvSpPr>
-        <p:spPr/>
-        <p:txBody>
-          <a:bodyPr/>
-          <a:lstStyle/>
-          <a:p>
-            <a:r>
-              <a:rPr lang="en-US" dirty="0" smtClean="0">
-                <a:solidFill>
-                  <a:srgbClr val="FF0000"/>
-                </a:solidFill>
-              </a:rPr>
-              <a:t>[add uC design diagram from HW once signals are more descriptive]</a:t>
-            </a:r>
-            <a:endParaRPr lang="en-US" dirty="0">
-              <a:solidFill>
-                <a:srgbClr val="FF0000"/>
-              </a:solidFill>
-            </a:endParaRPr>
-          </a:p>
-        </p:txBody>
-      </p:sp>
-    </p:spTree>
-    <p:extLst>
-      <p:ext uri="{BB962C8B-B14F-4D97-AF65-F5344CB8AC3E}">
-        <p14:creationId xmlns:p14="http://schemas.microsoft.com/office/powerpoint/2010/main" val="4178376558"/>
-      </p:ext>
-    </p:extLst>
-  </p:cSld>
-  <p:clrMapOvr>
-    <a:masterClrMapping/>
-  </p:clrMapOvr>
-  <p:timing>
-    <p:tnLst>
-      <p:par>
-        <p:cTn id="1" dur="indefinite" restart="never" nodeType="tmRoot"/>
-      </p:par>
-    </p:tnLst>
-  </p:timing>
-</p:sld>
-</file>
-
-<file path=ppt/slides/slide14.xml><?xml version="1.0" encoding="utf-8"?>
-<p:sld xmlns:a="http://schemas.openxmlformats.org/drawingml/2006/main" xmlns:r="http://schemas.openxmlformats.org/officeDocument/2006/relationships" xmlns:p="http://schemas.openxmlformats.org/presentationml/2006/main">
-  <p:cSld>
-    <p:spTree>
-      <p:nvGrpSpPr>
-        <p:cNvPr id="1" name=""/>
-        <p:cNvGrpSpPr/>
-        <p:nvPr/>
-      </p:nvGrpSpPr>
-      <p:grpSpPr>
-        <a:xfrm>
-          <a:off x="0" y="0"/>
-          <a:ext cx="0" cy="0"/>
-          <a:chOff x="0" y="0"/>
-          <a:chExt cx="0" cy="0"/>
-        </a:xfrm>
-      </p:grpSpPr>
-      <p:sp>
-        <p:nvSpPr>
-          <p:cNvPr id="2" name="Title 1"/>
-          <p:cNvSpPr>
-            <a:spLocks noGrp="1"/>
-          </p:cNvSpPr>
-          <p:nvPr>
-            <p:ph type="title"/>
-          </p:nvPr>
-        </p:nvSpPr>
-        <p:spPr/>
-        <p:txBody>
-          <a:bodyPr/>
-          <a:lstStyle/>
-          <a:p>
-            <a:r>
-              <a:rPr lang="en-US" dirty="0" smtClean="0"/>
-              <a:t>Design</a:t>
-            </a:r>
-            <a:r>
-              <a:rPr lang="en-US" smtClean="0"/>
-              <a:t>: Coding</a:t>
-            </a:r>
-            <a:endParaRPr lang="en-US"/>
-          </a:p>
-        </p:txBody>
-      </p:sp>
-      <p:sp>
-        <p:nvSpPr>
-          <p:cNvPr id="3" name="Content Placeholder 2"/>
-          <p:cNvSpPr>
-            <a:spLocks noGrp="1"/>
-          </p:cNvSpPr>
-          <p:nvPr>
-            <p:ph sz="quarter" idx="13"/>
-          </p:nvPr>
-        </p:nvSpPr>
-        <p:spPr/>
-        <p:txBody>
-          <a:bodyPr/>
-          <a:lstStyle/>
-          <a:p>
-            <a:endParaRPr lang="en-US"/>
-          </a:p>
-        </p:txBody>
-      </p:sp>
-    </p:spTree>
-    <p:extLst>
-      <p:ext uri="{BB962C8B-B14F-4D97-AF65-F5344CB8AC3E}">
-        <p14:creationId xmlns:p14="http://schemas.microsoft.com/office/powerpoint/2010/main" val="2125910615"/>
-      </p:ext>
-    </p:extLst>
-  </p:cSld>
-  <p:clrMapOvr>
-    <a:masterClrMapping/>
-  </p:clrMapOvr>
-  <p:timing>
-    <p:tnLst>
-      <p:par>
-        <p:cTn id="1" dur="indefinite" restart="never" nodeType="tmRoot"/>
-      </p:par>
-    </p:tnLst>
-  </p:timing>
-</p:sld>
-</file>
-
 <file path=ppt/slides/slide15.xml><?xml version="1.0" encoding="utf-8"?>
 <p:sld xmlns:a="http://schemas.openxmlformats.org/drawingml/2006/main" xmlns:r="http://schemas.openxmlformats.org/officeDocument/2006/relationships" xmlns:p="http://schemas.openxmlformats.org/presentationml/2006/main">
   <p:cSld>
@@ -4266,104 +4368,70 @@
           <a:p>
             <a:r>
               <a:rPr lang="en-US" dirty="0" smtClean="0"/>
-              <a:t>Implementation</a:t>
+              <a:t>Design: Microcontroller</a:t>
             </a:r>
             <a:endParaRPr lang="en-US" dirty="0"/>
           </a:p>
         </p:txBody>
       </p:sp>
-      <p:sp>
-        <p:nvSpPr>
-          <p:cNvPr id="3" name="Content Placeholder 2"/>
-          <p:cNvSpPr>
-            <a:spLocks noGrp="1"/>
-          </p:cNvSpPr>
-          <p:nvPr>
-            <p:ph sz="quarter" idx="13"/>
-          </p:nvPr>
-        </p:nvSpPr>
-        <p:spPr/>
-        <p:txBody>
-          <a:bodyPr>
-            <a:normAutofit/>
-          </a:bodyPr>
-          <a:lstStyle/>
-          <a:p>
-            <a:r>
-              <a:rPr lang="en-US" dirty="0" smtClean="0"/>
-              <a:t>Board Layout: Eagle CAD Implemented</a:t>
-            </a:r>
-          </a:p>
-          <a:p>
-            <a:pPr lvl="1"/>
-            <a:r>
-              <a:rPr lang="en-US" dirty="0" smtClean="0"/>
-              <a:t>Pin 1 Convention top left</a:t>
-            </a:r>
-          </a:p>
-          <a:p>
-            <a:pPr lvl="1"/>
-            <a:r>
-              <a:rPr lang="en-US" dirty="0" smtClean="0"/>
-              <a:t>Caps as close as possible to ICs</a:t>
-            </a:r>
-          </a:p>
-          <a:p>
-            <a:pPr lvl="1"/>
-            <a:r>
-              <a:rPr lang="el-GR" dirty="0"/>
-              <a:t>μ</a:t>
-            </a:r>
-            <a:r>
-              <a:rPr lang="en-US" dirty="0" smtClean="0"/>
-              <a:t>C centered for space management</a:t>
-            </a:r>
-          </a:p>
-          <a:p>
-            <a:pPr lvl="1"/>
-            <a:r>
-              <a:rPr lang="en-US" dirty="0" smtClean="0"/>
-              <a:t>Large power lines</a:t>
-            </a:r>
-          </a:p>
-          <a:p>
-            <a:pPr lvl="1"/>
-            <a:r>
-              <a:rPr lang="en-US" dirty="0" smtClean="0"/>
-              <a:t>Signal Lines Rx, Tx same length</a:t>
-            </a:r>
-          </a:p>
-          <a:p>
-            <a:pPr lvl="1"/>
-            <a:r>
-              <a:rPr lang="en-US" dirty="0" smtClean="0"/>
-              <a:t>LCD header centric</a:t>
-            </a:r>
-          </a:p>
-          <a:p>
-            <a:pPr lvl="1"/>
-            <a:r>
-              <a:rPr lang="en-US" dirty="0" smtClean="0"/>
-              <a:t>Test points and vias for all GPIOs (modifiable)</a:t>
-            </a:r>
-          </a:p>
-          <a:p>
-            <a:pPr lvl="1"/>
-            <a:r>
-              <a:rPr lang="en-US" dirty="0" smtClean="0"/>
-              <a:t>Magnetometer headers “Isolated” from noise</a:t>
-            </a:r>
-          </a:p>
-          <a:p>
-            <a:pPr lvl="1"/>
-            <a:endParaRPr lang="en-US" dirty="0"/>
-          </a:p>
-        </p:txBody>
-      </p:sp>
+      <p:pic>
+        <p:nvPicPr>
+          <p:cNvPr id="3075" name="Picture 3"/>
+          <p:cNvPicPr>
+            <a:picLocks noChangeAspect="1" noChangeArrowheads="1"/>
+          </p:cNvPicPr>
+          <p:nvPr/>
+        </p:nvPicPr>
+        <p:blipFill>
+          <a:blip r:embed="rId2">
+            <a:extLst>
+              <a:ext uri="{28A0092B-C50C-407E-A947-70E740481C1C}">
+                <a14:useLocalDpi xmlns:a14="http://schemas.microsoft.com/office/drawing/2010/main" val="0"/>
+              </a:ext>
+            </a:extLst>
+          </a:blip>
+          <a:srcRect/>
+          <a:stretch>
+            <a:fillRect/>
+          </a:stretch>
+        </p:blipFill>
+        <p:spPr bwMode="auto">
+          <a:xfrm>
+            <a:off x="1828800" y="1447800"/>
+            <a:ext cx="5410200" cy="5048250"/>
+          </a:xfrm>
+          <a:prstGeom prst="rect">
+            <a:avLst/>
+          </a:prstGeom>
+          <a:noFill/>
+          <a:ln>
+            <a:noFill/>
+          </a:ln>
+          <a:extLst>
+            <a:ext uri="{909E8E84-426E-40DD-AFC4-6F175D3DCCD1}">
+              <a14:hiddenFill xmlns:a14="http://schemas.microsoft.com/office/drawing/2010/main">
+                <a:solidFill>
+                  <a:schemeClr val="accent1"/>
+                </a:solidFill>
+              </a14:hiddenFill>
+            </a:ext>
+            <a:ext uri="{91240B29-F687-4F45-9708-019B960494DF}">
+              <a14:hiddenLine xmlns:a14="http://schemas.microsoft.com/office/drawing/2010/main" w="9525">
+                <a:solidFill>
+                  <a:schemeClr val="tx1"/>
+                </a:solidFill>
+                <a:miter lim="800000"/>
+                <a:headEnd/>
+                <a:tailEnd/>
+              </a14:hiddenLine>
+            </a:ext>
+          </a:extLst>
+        </p:spPr>
+      </p:pic>
     </p:spTree>
     <p:extLst>
       <p:ext uri="{BB962C8B-B14F-4D97-AF65-F5344CB8AC3E}">
-        <p14:creationId xmlns:p14="http://schemas.microsoft.com/office/powerpoint/2010/main" val="2443624474"/>
+        <p14:creationId xmlns:p14="http://schemas.microsoft.com/office/powerpoint/2010/main" val="4178376558"/>
       </p:ext>
     </p:extLst>
   </p:cSld>
@@ -4414,64 +4482,76 @@
           <a:p>
             <a:r>
               <a:rPr lang="en-US" dirty="0" smtClean="0"/>
-              <a:t>IP/Prior Work</a:t>
+              <a:t>Design: LCD</a:t>
             </a:r>
             <a:endParaRPr lang="en-US" dirty="0"/>
           </a:p>
         </p:txBody>
       </p:sp>
-      <p:sp>
-        <p:nvSpPr>
-          <p:cNvPr id="3" name="Content Placeholder 2"/>
-          <p:cNvSpPr>
-            <a:spLocks noGrp="1"/>
-          </p:cNvSpPr>
-          <p:nvPr>
-            <p:ph sz="quarter" idx="13"/>
-          </p:nvPr>
-        </p:nvSpPr>
-        <p:spPr/>
-        <p:txBody>
-          <a:bodyPr/>
-          <a:lstStyle/>
-          <a:p>
-            <a:r>
-              <a:rPr lang="en-US" dirty="0" smtClean="0"/>
-              <a:t>We utilized the LCD and Magnetometer  Development Boards.</a:t>
-            </a:r>
-          </a:p>
-          <a:p>
-            <a:r>
-              <a:rPr lang="en-US" dirty="0" smtClean="0"/>
-              <a:t>Implementing these COTS Items cost an extra $10 per board, and added design, and implementation constraints.  </a:t>
-            </a:r>
-          </a:p>
-          <a:p>
-            <a:r>
-              <a:rPr lang="en-US" dirty="0" smtClean="0"/>
-              <a:t>Saving the time and effort of integrating these components.</a:t>
-            </a:r>
-            <a:endParaRPr lang="en-US" dirty="0"/>
-          </a:p>
-        </p:txBody>
-      </p:sp>
+      <p:pic>
+        <p:nvPicPr>
+          <p:cNvPr id="4098" name="Picture 2"/>
+          <p:cNvPicPr>
+            <a:picLocks noChangeAspect="1" noChangeArrowheads="1"/>
+          </p:cNvPicPr>
+          <p:nvPr/>
+        </p:nvPicPr>
+        <p:blipFill>
+          <a:blip r:embed="rId2">
+            <a:extLst>
+              <a:ext uri="{28A0092B-C50C-407E-A947-70E740481C1C}">
+                <a14:useLocalDpi xmlns:a14="http://schemas.microsoft.com/office/drawing/2010/main" val="0"/>
+              </a:ext>
+            </a:extLst>
+          </a:blip>
+          <a:srcRect/>
+          <a:stretch>
+            <a:fillRect/>
+          </a:stretch>
+        </p:blipFill>
+        <p:spPr bwMode="auto">
+          <a:xfrm>
+            <a:off x="1524000" y="1752600"/>
+            <a:ext cx="6019800" cy="4495800"/>
+          </a:xfrm>
+          <a:prstGeom prst="rect">
+            <a:avLst/>
+          </a:prstGeom>
+          <a:noFill/>
+          <a:ln>
+            <a:noFill/>
+          </a:ln>
+          <a:extLst>
+            <a:ext uri="{909E8E84-426E-40DD-AFC4-6F175D3DCCD1}">
+              <a14:hiddenFill xmlns:a14="http://schemas.microsoft.com/office/drawing/2010/main">
+                <a:solidFill>
+                  <a:schemeClr val="accent1"/>
+                </a:solidFill>
+              </a14:hiddenFill>
+            </a:ext>
+            <a:ext uri="{91240B29-F687-4F45-9708-019B960494DF}">
+              <a14:hiddenLine xmlns:a14="http://schemas.microsoft.com/office/drawing/2010/main" w="9525">
+                <a:solidFill>
+                  <a:schemeClr val="tx1"/>
+                </a:solidFill>
+                <a:miter lim="800000"/>
+                <a:headEnd/>
+                <a:tailEnd/>
+              </a14:hiddenLine>
+            </a:ext>
+          </a:extLst>
+        </p:spPr>
+      </p:pic>
     </p:spTree>
     <p:extLst>
       <p:ext uri="{BB962C8B-B14F-4D97-AF65-F5344CB8AC3E}">
-        <p14:creationId xmlns:p14="http://schemas.microsoft.com/office/powerpoint/2010/main" val="332616918"/>
+        <p14:creationId xmlns:p14="http://schemas.microsoft.com/office/powerpoint/2010/main" val="2913149415"/>
       </p:ext>
     </p:extLst>
   </p:cSld>
   <p:clrMapOvr>
     <a:masterClrMapping/>
   </p:clrMapOvr>
-  <p:timing>
-    <p:tnLst>
-      <p:par>
-        <p:cTn id="1" dur="indefinite" restart="never" nodeType="tmRoot"/>
-      </p:par>
-    </p:tnLst>
-  </p:timing>
 </p:sld>
 </file>
 
@@ -4504,16 +4584,18 @@
         </p:nvSpPr>
         <p:spPr/>
         <p:txBody>
-          <a:bodyPr>
-            <a:normAutofit/>
-          </a:bodyPr>
-          <a:lstStyle/>
-          <a:p>
-            <a:r>
-              <a:rPr lang="en-US" dirty="0" smtClean="0"/>
-              <a:t>Testing</a:t>
-            </a:r>
-            <a:endParaRPr lang="en-US" dirty="0"/>
+          <a:bodyPr/>
+          <a:lstStyle/>
+          <a:p>
+            <a:r>
+              <a:rPr lang="en-US" dirty="0" smtClean="0"/>
+              <a:t>Design</a:t>
+            </a:r>
+            <a:r>
+              <a:rPr lang="en-US" smtClean="0"/>
+              <a:t>: Coding</a:t>
+            </a:r>
+            <a:endParaRPr lang="en-US"/>
           </a:p>
         </p:txBody>
       </p:sp>
@@ -4529,79 +4611,17 @@
         </p:nvSpPr>
         <p:spPr/>
         <p:txBody>
-          <a:bodyPr>
-            <a:normAutofit/>
-          </a:bodyPr>
-          <a:lstStyle/>
-          <a:p>
-            <a:r>
-              <a:rPr lang="en-US" dirty="0" smtClean="0"/>
-              <a:t>PMIC: </a:t>
-            </a:r>
-          </a:p>
-          <a:p>
-            <a:pPr lvl="1"/>
-            <a:r>
-              <a:rPr lang="en-US" dirty="0"/>
-              <a:t>U</a:t>
-            </a:r>
-            <a:r>
-              <a:rPr lang="en-US" dirty="0" smtClean="0"/>
-              <a:t>se implemented test points for appropriate DC values</a:t>
-            </a:r>
-          </a:p>
-          <a:p>
-            <a:pPr lvl="1"/>
-            <a:r>
-              <a:rPr lang="en-US" dirty="0"/>
-              <a:t>C</a:t>
-            </a:r>
-            <a:r>
-              <a:rPr lang="en-US" dirty="0" smtClean="0"/>
-              <a:t>harge a battery and test its voltage ensuring that PMIC stops charging at correct voltage</a:t>
-            </a:r>
-          </a:p>
-          <a:p>
-            <a:pPr lvl="1"/>
-            <a:r>
-              <a:rPr lang="en-US" dirty="0" smtClean="0"/>
-              <a:t>Check supply voltages to daughterboards</a:t>
-            </a:r>
-          </a:p>
-          <a:p>
-            <a:r>
-              <a:rPr lang="en-US" dirty="0" smtClean="0"/>
-              <a:t>Microcontroller:</a:t>
-            </a:r>
-          </a:p>
-          <a:p>
-            <a:pPr lvl="1"/>
-            <a:r>
-              <a:rPr lang="en-US" dirty="0" smtClean="0"/>
-              <a:t>Connect via USB</a:t>
-            </a:r>
-          </a:p>
-          <a:p>
-            <a:pPr lvl="1"/>
-            <a:r>
-              <a:rPr lang="en-US" dirty="0" smtClean="0"/>
-              <a:t>GPIO’s used for switching power on to LCD and sensor easily verified using a multimeter</a:t>
-            </a:r>
-          </a:p>
-          <a:p>
-            <a:pPr lvl="1"/>
-            <a:r>
-              <a:rPr lang="en-US" dirty="0" smtClean="0"/>
-              <a:t>Calibration verified using known working compass</a:t>
-            </a:r>
-            <a:endParaRPr lang="en-US" dirty="0" smtClean="0"/>
+          <a:bodyPr/>
+          <a:lstStyle/>
+          <a:p>
+            <a:endParaRPr lang="en-US"/>
           </a:p>
         </p:txBody>
       </p:sp>
     </p:spTree>
     <p:extLst>
       <p:ext uri="{BB962C8B-B14F-4D97-AF65-F5344CB8AC3E}">
-        <p14:creationId xmlns:p14="http://schemas.microsoft.com/office/powerpoint/2010/main" val="1751834017"/>
+        <p14:creationId xmlns:p14="http://schemas.microsoft.com/office/powerpoint/2010/main" val="2125910615"/>
       </p:ext>
     </p:extLst>
   </p:cSld>
@@ -4652,6 +4672,529 @@
           <a:p>
             <a:r>
               <a:rPr lang="en-US" dirty="0" smtClean="0"/>
+              <a:t>Implementation</a:t>
+            </a:r>
+            <a:endParaRPr lang="en-US" dirty="0"/>
+          </a:p>
+        </p:txBody>
+      </p:sp>
+      <p:sp>
+        <p:nvSpPr>
+          <p:cNvPr id="3" name="Content Placeholder 2"/>
+          <p:cNvSpPr>
+            <a:spLocks noGrp="1"/>
+          </p:cNvSpPr>
+          <p:nvPr>
+            <p:ph sz="quarter" idx="13"/>
+          </p:nvPr>
+        </p:nvSpPr>
+        <p:spPr/>
+        <p:txBody>
+          <a:bodyPr>
+            <a:normAutofit/>
+          </a:bodyPr>
+          <a:lstStyle/>
+          <a:p>
+            <a:r>
+              <a:rPr lang="en-US" dirty="0" smtClean="0"/>
+              <a:t>Board Layout: Eagle CAD Implemented</a:t>
+            </a:r>
+          </a:p>
+          <a:p>
+            <a:pPr lvl="1"/>
+            <a:r>
+              <a:rPr lang="en-US" dirty="0" smtClean="0"/>
+              <a:t>Pin 1 Convention top left</a:t>
+            </a:r>
+          </a:p>
+          <a:p>
+            <a:pPr lvl="1"/>
+            <a:r>
+              <a:rPr lang="en-US" dirty="0" smtClean="0"/>
+              <a:t>Caps as close as possible to ICs</a:t>
+            </a:r>
+          </a:p>
+          <a:p>
+            <a:pPr lvl="1"/>
+            <a:r>
+              <a:rPr lang="el-GR" dirty="0"/>
+              <a:t>μ</a:t>
+            </a:r>
+            <a:r>
+              <a:rPr lang="en-US" dirty="0" smtClean="0"/>
+              <a:t>C centered for space management</a:t>
+            </a:r>
+          </a:p>
+          <a:p>
+            <a:pPr lvl="1"/>
+            <a:r>
+              <a:rPr lang="en-US" dirty="0" smtClean="0"/>
+              <a:t>Large power lines</a:t>
+            </a:r>
+          </a:p>
+          <a:p>
+            <a:pPr lvl="1"/>
+            <a:r>
+              <a:rPr lang="en-US" dirty="0" smtClean="0"/>
+              <a:t>Signal Lines Rx, Tx same length</a:t>
+            </a:r>
+          </a:p>
+          <a:p>
+            <a:pPr lvl="1"/>
+            <a:r>
+              <a:rPr lang="en-US" dirty="0" smtClean="0"/>
+              <a:t>LCD header centric</a:t>
+            </a:r>
+          </a:p>
+          <a:p>
+            <a:pPr lvl="1"/>
+            <a:r>
+              <a:rPr lang="en-US" dirty="0" smtClean="0"/>
+              <a:t>Test points and vias for all GPIOs (modifiable)</a:t>
+            </a:r>
+          </a:p>
+          <a:p>
+            <a:pPr lvl="1"/>
+            <a:r>
+              <a:rPr lang="en-US" dirty="0" smtClean="0"/>
+              <a:t>Magnetometer headers “Isolated” from noise</a:t>
+            </a:r>
+          </a:p>
+          <a:p>
+            <a:pPr lvl="1"/>
+            <a:endParaRPr lang="en-US" dirty="0"/>
+          </a:p>
+        </p:txBody>
+      </p:sp>
+    </p:spTree>
+    <p:extLst>
+      <p:ext uri="{BB962C8B-B14F-4D97-AF65-F5344CB8AC3E}">
+        <p14:creationId xmlns:p14="http://schemas.microsoft.com/office/powerpoint/2010/main" val="2443624474"/>
+      </p:ext>
+    </p:extLst>
+  </p:cSld>
+  <p:clrMapOvr>
+    <a:masterClrMapping/>
+  </p:clrMapOvr>
+  <p:timing>
+    <p:tnLst>
+      <p:par>
+        <p:cTn id="1" dur="indefinite" restart="never" nodeType="tmRoot"/>
+      </p:par>
+    </p:tnLst>
+  </p:timing>
+</p:sld>
+</file>
+
+<file path=ppt/slides/slide19.xml><?xml version="1.0" encoding="utf-8"?>
+<p:sld xmlns:a="http://schemas.openxmlformats.org/drawingml/2006/main" xmlns:r="http://schemas.openxmlformats.org/officeDocument/2006/relationships" xmlns:p="http://schemas.openxmlformats.org/presentationml/2006/main">
+  <p:cSld>
+    <p:spTree>
+      <p:nvGrpSpPr>
+        <p:cNvPr id="1" name=""/>
+        <p:cNvGrpSpPr/>
+        <p:nvPr/>
+      </p:nvGrpSpPr>
+      <p:grpSpPr>
+        <a:xfrm>
+          <a:off x="0" y="0"/>
+          <a:ext cx="0" cy="0"/>
+          <a:chOff x="0" y="0"/>
+          <a:chExt cx="0" cy="0"/>
+        </a:xfrm>
+      </p:grpSpPr>
+      <p:sp>
+        <p:nvSpPr>
+          <p:cNvPr id="2" name="Title 1"/>
+          <p:cNvSpPr>
+            <a:spLocks noGrp="1"/>
+          </p:cNvSpPr>
+          <p:nvPr>
+            <p:ph type="title"/>
+          </p:nvPr>
+        </p:nvSpPr>
+        <p:spPr/>
+        <p:txBody>
+          <a:bodyPr/>
+          <a:lstStyle/>
+          <a:p>
+            <a:r>
+              <a:rPr lang="en-US" dirty="0" smtClean="0"/>
+              <a:t>IP/Prior Work</a:t>
+            </a:r>
+            <a:endParaRPr lang="en-US" dirty="0"/>
+          </a:p>
+        </p:txBody>
+      </p:sp>
+      <p:sp>
+        <p:nvSpPr>
+          <p:cNvPr id="3" name="Content Placeholder 2"/>
+          <p:cNvSpPr>
+            <a:spLocks noGrp="1"/>
+          </p:cNvSpPr>
+          <p:nvPr>
+            <p:ph sz="quarter" idx="13"/>
+          </p:nvPr>
+        </p:nvSpPr>
+        <p:spPr/>
+        <p:txBody>
+          <a:bodyPr/>
+          <a:lstStyle/>
+          <a:p>
+            <a:pPr>
+              <a:spcBef>
+                <a:spcPts val="1200"/>
+              </a:spcBef>
+              <a:spcAft>
+                <a:spcPts val="1200"/>
+              </a:spcAft>
+            </a:pPr>
+            <a:r>
+              <a:rPr lang="en-US" dirty="0" smtClean="0"/>
+              <a:t>We utilized the LCD and Magnetometer  Development Boards.</a:t>
+            </a:r>
+          </a:p>
+          <a:p>
+            <a:pPr>
+              <a:spcBef>
+                <a:spcPts val="1200"/>
+              </a:spcBef>
+              <a:spcAft>
+                <a:spcPts val="1200"/>
+              </a:spcAft>
+            </a:pPr>
+            <a:r>
+              <a:rPr lang="en-US" dirty="0" smtClean="0"/>
+              <a:t>Implementing these COTS Items cost an extra $10 per board, and added design, and implementation constraints.  </a:t>
+            </a:r>
+          </a:p>
+          <a:p>
+            <a:pPr>
+              <a:spcBef>
+                <a:spcPts val="1200"/>
+              </a:spcBef>
+              <a:spcAft>
+                <a:spcPts val="1200"/>
+              </a:spcAft>
+            </a:pPr>
+            <a:r>
+              <a:rPr lang="en-US" dirty="0" smtClean="0"/>
+              <a:t>Saving the time and effort of integrating these components.</a:t>
+            </a:r>
+            <a:endParaRPr lang="en-US" dirty="0"/>
+          </a:p>
+        </p:txBody>
+      </p:sp>
+    </p:spTree>
+    <p:extLst>
+      <p:ext uri="{BB962C8B-B14F-4D97-AF65-F5344CB8AC3E}">
+        <p14:creationId xmlns:p14="http://schemas.microsoft.com/office/powerpoint/2010/main" val="332616918"/>
+      </p:ext>
+    </p:extLst>
+  </p:cSld>
+  <p:clrMapOvr>
+    <a:masterClrMapping/>
+  </p:clrMapOvr>
+  <p:timing>
+    <p:tnLst>
+      <p:par>
+        <p:cTn id="1" dur="indefinite" restart="never" nodeType="tmRoot"/>
+      </p:par>
+    </p:tnLst>
+  </p:timing>
+</p:sld>
+</file>
+
+<file path=ppt/slides/slide2.xml><?xml version="1.0" encoding="utf-8"?>
+<p:sld xmlns:a="http://schemas.openxmlformats.org/drawingml/2006/main" xmlns:r="http://schemas.openxmlformats.org/officeDocument/2006/relationships" xmlns:p="http://schemas.openxmlformats.org/presentationml/2006/main">
+  <p:cSld>
+    <p:spTree>
+      <p:nvGrpSpPr>
+        <p:cNvPr id="1" name=""/>
+        <p:cNvGrpSpPr/>
+        <p:nvPr/>
+      </p:nvGrpSpPr>
+      <p:grpSpPr>
+        <a:xfrm>
+          <a:off x="0" y="0"/>
+          <a:ext cx="0" cy="0"/>
+          <a:chOff x="0" y="0"/>
+          <a:chExt cx="0" cy="0"/>
+        </a:xfrm>
+      </p:grpSpPr>
+      <p:sp>
+        <p:nvSpPr>
+          <p:cNvPr id="2" name="Title 1"/>
+          <p:cNvSpPr>
+            <a:spLocks noGrp="1"/>
+          </p:cNvSpPr>
+          <p:nvPr>
+            <p:ph type="title"/>
+          </p:nvPr>
+        </p:nvSpPr>
+        <p:spPr/>
+        <p:txBody>
+          <a:bodyPr/>
+          <a:lstStyle/>
+          <a:p>
+            <a:r>
+              <a:rPr lang="en-US" dirty="0" smtClean="0"/>
+              <a:t>Needs</a:t>
+            </a:r>
+            <a:endParaRPr lang="en-US" dirty="0"/>
+          </a:p>
+        </p:txBody>
+      </p:sp>
+      <p:sp>
+        <p:nvSpPr>
+          <p:cNvPr id="3" name="Content Placeholder 2"/>
+          <p:cNvSpPr>
+            <a:spLocks noGrp="1"/>
+          </p:cNvSpPr>
+          <p:nvPr>
+            <p:ph sz="quarter" idx="13"/>
+          </p:nvPr>
+        </p:nvSpPr>
+        <p:spPr/>
+        <p:txBody>
+          <a:bodyPr/>
+          <a:lstStyle/>
+          <a:p>
+            <a:endParaRPr lang="en-US" dirty="0" smtClean="0"/>
+          </a:p>
+          <a:p>
+            <a:r>
+              <a:rPr lang="en-US" dirty="0" smtClean="0"/>
+              <a:t>Land Navigation Human Calibration</a:t>
+            </a:r>
+          </a:p>
+          <a:p>
+            <a:endParaRPr lang="en-US" dirty="0" smtClean="0"/>
+          </a:p>
+          <a:p>
+            <a:r>
+              <a:rPr lang="en-US" dirty="0" smtClean="0"/>
+              <a:t>Robot needs compass input</a:t>
+            </a:r>
+          </a:p>
+          <a:p>
+            <a:endParaRPr lang="en-US" dirty="0" smtClean="0"/>
+          </a:p>
+          <a:p>
+            <a:r>
+              <a:rPr lang="en-US" dirty="0"/>
+              <a:t>Project </a:t>
+            </a:r>
+            <a:r>
+              <a:rPr lang="en-US" dirty="0" smtClean="0"/>
+              <a:t>required for </a:t>
+            </a:r>
+            <a:r>
+              <a:rPr lang="en-US" dirty="0"/>
+              <a:t>Practicum</a:t>
+            </a:r>
+          </a:p>
+          <a:p>
+            <a:endParaRPr lang="en-US" dirty="0" smtClean="0"/>
+          </a:p>
+        </p:txBody>
+      </p:sp>
+    </p:spTree>
+    <p:extLst>
+      <p:ext uri="{BB962C8B-B14F-4D97-AF65-F5344CB8AC3E}">
+        <p14:creationId xmlns:p14="http://schemas.microsoft.com/office/powerpoint/2010/main" val="1181858081"/>
+      </p:ext>
+    </p:extLst>
+  </p:cSld>
+  <p:clrMapOvr>
+    <a:masterClrMapping/>
+  </p:clrMapOvr>
+  <p:timing>
+    <p:tnLst>
+      <p:par>
+        <p:cTn id="1" dur="indefinite" restart="never" nodeType="tmRoot"/>
+      </p:par>
+    </p:tnLst>
+  </p:timing>
+</p:sld>
+</file>
+
+<file path=ppt/slides/slide20.xml><?xml version="1.0" encoding="utf-8"?>
+<p:sld xmlns:a="http://schemas.openxmlformats.org/drawingml/2006/main" xmlns:r="http://schemas.openxmlformats.org/officeDocument/2006/relationships" xmlns:p="http://schemas.openxmlformats.org/presentationml/2006/main">
+  <p:cSld>
+    <p:spTree>
+      <p:nvGrpSpPr>
+        <p:cNvPr id="1" name=""/>
+        <p:cNvGrpSpPr/>
+        <p:nvPr/>
+      </p:nvGrpSpPr>
+      <p:grpSpPr>
+        <a:xfrm>
+          <a:off x="0" y="0"/>
+          <a:ext cx="0" cy="0"/>
+          <a:chOff x="0" y="0"/>
+          <a:chExt cx="0" cy="0"/>
+        </a:xfrm>
+      </p:grpSpPr>
+      <p:sp>
+        <p:nvSpPr>
+          <p:cNvPr id="2" name="Title 1"/>
+          <p:cNvSpPr>
+            <a:spLocks noGrp="1"/>
+          </p:cNvSpPr>
+          <p:nvPr>
+            <p:ph type="title"/>
+          </p:nvPr>
+        </p:nvSpPr>
+        <p:spPr/>
+        <p:txBody>
+          <a:bodyPr>
+            <a:normAutofit/>
+          </a:bodyPr>
+          <a:lstStyle/>
+          <a:p>
+            <a:r>
+              <a:rPr lang="en-US" dirty="0" smtClean="0"/>
+              <a:t>Testing</a:t>
+            </a:r>
+            <a:endParaRPr lang="en-US" dirty="0"/>
+          </a:p>
+        </p:txBody>
+      </p:sp>
+      <p:sp>
+        <p:nvSpPr>
+          <p:cNvPr id="3" name="Content Placeholder 2"/>
+          <p:cNvSpPr>
+            <a:spLocks noGrp="1"/>
+          </p:cNvSpPr>
+          <p:nvPr>
+            <p:ph sz="quarter" idx="13"/>
+          </p:nvPr>
+        </p:nvSpPr>
+        <p:spPr/>
+        <p:txBody>
+          <a:bodyPr>
+            <a:normAutofit/>
+          </a:bodyPr>
+          <a:lstStyle/>
+          <a:p>
+            <a:r>
+              <a:rPr lang="en-US" dirty="0" smtClean="0"/>
+              <a:t>PMIC: </a:t>
+            </a:r>
+          </a:p>
+          <a:p>
+            <a:pPr lvl="1"/>
+            <a:r>
+              <a:rPr lang="en-US" dirty="0"/>
+              <a:t>U</a:t>
+            </a:r>
+            <a:r>
+              <a:rPr lang="en-US" dirty="0" smtClean="0"/>
+              <a:t>se implemented test points for appropriate DC values</a:t>
+            </a:r>
+          </a:p>
+          <a:p>
+            <a:pPr lvl="1"/>
+            <a:r>
+              <a:rPr lang="en-US" dirty="0"/>
+              <a:t>C</a:t>
+            </a:r>
+            <a:r>
+              <a:rPr lang="en-US" dirty="0" smtClean="0"/>
+              <a:t>harge a battery and test its voltage ensuring that PMIC stops charging at correct voltage</a:t>
+            </a:r>
+          </a:p>
+          <a:p>
+            <a:pPr lvl="1"/>
+            <a:r>
+              <a:rPr lang="en-US" dirty="0" smtClean="0"/>
+              <a:t>Check supply voltages to daughterboards</a:t>
+            </a:r>
+          </a:p>
+          <a:p>
+            <a:r>
+              <a:rPr lang="en-US" dirty="0" smtClean="0"/>
+              <a:t>Microcontroller:</a:t>
+            </a:r>
+          </a:p>
+          <a:p>
+            <a:pPr lvl="1"/>
+            <a:r>
+              <a:rPr lang="en-US" dirty="0" smtClean="0"/>
+              <a:t>Connect via USB</a:t>
+            </a:r>
+          </a:p>
+          <a:p>
+            <a:pPr lvl="1"/>
+            <a:r>
+              <a:rPr lang="en-US" dirty="0" smtClean="0"/>
+              <a:t>GPIO’s used for switching power on to LCD and sensor easily verified using a multimeter</a:t>
+            </a:r>
+          </a:p>
+          <a:p>
+            <a:pPr lvl="1"/>
+            <a:r>
+              <a:rPr lang="en-US" dirty="0" smtClean="0"/>
+              <a:t>Calibration verified using known working compass</a:t>
+            </a:r>
+          </a:p>
+        </p:txBody>
+      </p:sp>
+    </p:spTree>
+    <p:extLst>
+      <p:ext uri="{BB962C8B-B14F-4D97-AF65-F5344CB8AC3E}">
+        <p14:creationId xmlns:p14="http://schemas.microsoft.com/office/powerpoint/2010/main" val="1751834017"/>
+      </p:ext>
+    </p:extLst>
+  </p:cSld>
+  <p:clrMapOvr>
+    <a:masterClrMapping/>
+  </p:clrMapOvr>
+  <p:timing>
+    <p:tnLst>
+      <p:par>
+        <p:cTn id="1" dur="indefinite" restart="never" nodeType="tmRoot"/>
+      </p:par>
+    </p:tnLst>
+  </p:timing>
+</p:sld>
+</file>
+
+<file path=ppt/slides/slide21.xml><?xml version="1.0" encoding="utf-8"?>
+<p:sld xmlns:a="http://schemas.openxmlformats.org/drawingml/2006/main" xmlns:r="http://schemas.openxmlformats.org/officeDocument/2006/relationships" xmlns:p="http://schemas.openxmlformats.org/presentationml/2006/main">
+  <p:cSld>
+    <p:spTree>
+      <p:nvGrpSpPr>
+        <p:cNvPr id="1" name=""/>
+        <p:cNvGrpSpPr/>
+        <p:nvPr/>
+      </p:nvGrpSpPr>
+      <p:grpSpPr>
+        <a:xfrm>
+          <a:off x="0" y="0"/>
+          <a:ext cx="0" cy="0"/>
+          <a:chOff x="0" y="0"/>
+          <a:chExt cx="0" cy="0"/>
+        </a:xfrm>
+      </p:grpSpPr>
+      <p:sp>
+        <p:nvSpPr>
+          <p:cNvPr id="2" name="Title 1"/>
+          <p:cNvSpPr>
+            <a:spLocks noGrp="1"/>
+          </p:cNvSpPr>
+          <p:nvPr>
+            <p:ph type="title"/>
+          </p:nvPr>
+        </p:nvSpPr>
+        <p:spPr/>
+        <p:txBody>
+          <a:bodyPr/>
+          <a:lstStyle/>
+          <a:p>
+            <a:r>
+              <a:rPr lang="en-US" dirty="0" smtClean="0"/>
               <a:t>Testing</a:t>
             </a:r>
             <a:endParaRPr lang="en-US" dirty="0"/>
@@ -4701,12 +5244,8 @@
           </a:p>
           <a:p>
             <a:r>
-              <a:rPr lang="en-US" dirty="0"/>
-              <a:t>Magnetometer/</a:t>
-            </a:r>
-            <a:r>
-              <a:rPr lang="en-US" dirty="0" err="1"/>
-              <a:t>Acceleromter</a:t>
+              <a:rPr lang="en-US" dirty="0" smtClean="0"/>
+              <a:t>Magnetometer/Accelerometer</a:t>
             </a:r>
             <a:endParaRPr lang="en-US" dirty="0"/>
           </a:p>
@@ -4756,7 +5295,7 @@
 </p:sld>
 </file>
 
-<file path=ppt/slides/slide19.xml><?xml version="1.0" encoding="utf-8"?>
+<file path=ppt/slides/slide22.xml><?xml version="1.0" encoding="utf-8"?>
 <p:sld xmlns:a="http://schemas.openxmlformats.org/drawingml/2006/main" xmlns:r="http://schemas.openxmlformats.org/officeDocument/2006/relationships" xmlns:p="http://schemas.openxmlformats.org/presentationml/2006/main">
   <p:cSld>
     <p:spTree>
@@ -4855,395 +5394,6 @@
 </p:sld>
 </file>
 
-<file path=ppt/slides/slide2.xml><?xml version="1.0" encoding="utf-8"?>
-<p:sld xmlns:a="http://schemas.openxmlformats.org/drawingml/2006/main" xmlns:r="http://schemas.openxmlformats.org/officeDocument/2006/relationships" xmlns:p="http://schemas.openxmlformats.org/presentationml/2006/main">
-  <p:cSld>
-    <p:spTree>
-      <p:nvGrpSpPr>
-        <p:cNvPr id="1" name=""/>
-        <p:cNvGrpSpPr/>
-        <p:nvPr/>
-      </p:nvGrpSpPr>
-      <p:grpSpPr>
-        <a:xfrm>
-          <a:off x="0" y="0"/>
-          <a:ext cx="0" cy="0"/>
-          <a:chOff x="0" y="0"/>
-          <a:chExt cx="0" cy="0"/>
-        </a:xfrm>
-      </p:grpSpPr>
-      <p:sp>
-        <p:nvSpPr>
-          <p:cNvPr id="2" name="Title 1"/>
-          <p:cNvSpPr>
-            <a:spLocks noGrp="1"/>
-          </p:cNvSpPr>
-          <p:nvPr>
-            <p:ph type="title"/>
-          </p:nvPr>
-        </p:nvSpPr>
-        <p:spPr/>
-        <p:txBody>
-          <a:bodyPr/>
-          <a:lstStyle/>
-          <a:p>
-            <a:r>
-              <a:rPr lang="en-US" dirty="0" smtClean="0"/>
-              <a:t>Needs</a:t>
-            </a:r>
-            <a:endParaRPr lang="en-US" dirty="0"/>
-          </a:p>
-        </p:txBody>
-      </p:sp>
-      <p:sp>
-        <p:nvSpPr>
-          <p:cNvPr id="3" name="Content Placeholder 2"/>
-          <p:cNvSpPr>
-            <a:spLocks noGrp="1"/>
-          </p:cNvSpPr>
-          <p:nvPr>
-            <p:ph sz="quarter" idx="13"/>
-          </p:nvPr>
-        </p:nvSpPr>
-        <p:spPr/>
-        <p:txBody>
-          <a:bodyPr/>
-          <a:lstStyle/>
-          <a:p>
-            <a:endParaRPr lang="en-US" dirty="0" smtClean="0"/>
-          </a:p>
-          <a:p>
-            <a:r>
-              <a:rPr lang="en-US" dirty="0" smtClean="0"/>
-              <a:t>Land Navigation Human Calibration</a:t>
-            </a:r>
-          </a:p>
-          <a:p>
-            <a:endParaRPr lang="en-US" dirty="0" smtClean="0"/>
-          </a:p>
-          <a:p>
-            <a:r>
-              <a:rPr lang="en-US" dirty="0" smtClean="0"/>
-              <a:t>Robot needs compass input</a:t>
-            </a:r>
-          </a:p>
-          <a:p>
-            <a:endParaRPr lang="en-US" dirty="0" smtClean="0"/>
-          </a:p>
-          <a:p>
-            <a:r>
-              <a:rPr lang="en-US" dirty="0"/>
-              <a:t>Project </a:t>
-            </a:r>
-            <a:r>
-              <a:rPr lang="en-US" dirty="0" smtClean="0"/>
-              <a:t>required for </a:t>
-            </a:r>
-            <a:r>
-              <a:rPr lang="en-US" dirty="0"/>
-              <a:t>Practicum</a:t>
-            </a:r>
-          </a:p>
-          <a:p>
-            <a:endParaRPr lang="en-US" dirty="0" smtClean="0"/>
-          </a:p>
-        </p:txBody>
-      </p:sp>
-    </p:spTree>
-    <p:extLst>
-      <p:ext uri="{BB962C8B-B14F-4D97-AF65-F5344CB8AC3E}">
-        <p14:creationId xmlns:p14="http://schemas.microsoft.com/office/powerpoint/2010/main" val="1181858081"/>
-      </p:ext>
-    </p:extLst>
-  </p:cSld>
-  <p:clrMapOvr>
-    <a:masterClrMapping/>
-  </p:clrMapOvr>
-  <p:timing>
-    <p:tnLst>
-      <p:par>
-        <p:cTn id="1" dur="indefinite" restart="never" nodeType="tmRoot"/>
-      </p:par>
-    </p:tnLst>
-  </p:timing>
-</p:sld>
-</file>
-
-<file path=ppt/slides/slide20.xml><?xml version="1.0" encoding="utf-8"?>
-<p:sld xmlns:a="http://schemas.openxmlformats.org/drawingml/2006/main" xmlns:r="http://schemas.openxmlformats.org/officeDocument/2006/relationships" xmlns:p="http://schemas.openxmlformats.org/presentationml/2006/main">
-  <p:cSld>
-    <p:spTree>
-      <p:nvGrpSpPr>
-        <p:cNvPr id="1" name=""/>
-        <p:cNvGrpSpPr/>
-        <p:nvPr/>
-      </p:nvGrpSpPr>
-      <p:grpSpPr>
-        <a:xfrm>
-          <a:off x="0" y="0"/>
-          <a:ext cx="0" cy="0"/>
-          <a:chOff x="0" y="0"/>
-          <a:chExt cx="0" cy="0"/>
-        </a:xfrm>
-      </p:grpSpPr>
-      <p:sp>
-        <p:nvSpPr>
-          <p:cNvPr id="2" name="Title 1"/>
-          <p:cNvSpPr>
-            <a:spLocks noGrp="1"/>
-          </p:cNvSpPr>
-          <p:nvPr>
-            <p:ph type="title"/>
-          </p:nvPr>
-        </p:nvSpPr>
-        <p:spPr/>
-        <p:txBody>
-          <a:bodyPr/>
-          <a:lstStyle/>
-          <a:p>
-            <a:r>
-              <a:rPr lang="en-US" dirty="0" smtClean="0"/>
-              <a:t>Ben’s Contributions</a:t>
-            </a:r>
-            <a:endParaRPr lang="en-US" dirty="0"/>
-          </a:p>
-        </p:txBody>
-      </p:sp>
-      <p:sp>
-        <p:nvSpPr>
-          <p:cNvPr id="3" name="Content Placeholder 2"/>
-          <p:cNvSpPr>
-            <a:spLocks noGrp="1"/>
-          </p:cNvSpPr>
-          <p:nvPr>
-            <p:ph sz="quarter" idx="13"/>
-          </p:nvPr>
-        </p:nvSpPr>
-        <p:spPr/>
-        <p:txBody>
-          <a:bodyPr/>
-          <a:lstStyle/>
-          <a:p>
-            <a:endParaRPr lang="en-US"/>
-          </a:p>
-        </p:txBody>
-      </p:sp>
-    </p:spTree>
-    <p:extLst>
-      <p:ext uri="{BB962C8B-B14F-4D97-AF65-F5344CB8AC3E}">
-        <p14:creationId xmlns:p14="http://schemas.microsoft.com/office/powerpoint/2010/main" val="116923094"/>
-      </p:ext>
-    </p:extLst>
-  </p:cSld>
-  <p:clrMapOvr>
-    <a:masterClrMapping/>
-  </p:clrMapOvr>
-  <p:timing>
-    <p:tnLst>
-      <p:par>
-        <p:cTn id="1" dur="indefinite" restart="never" nodeType="tmRoot"/>
-      </p:par>
-    </p:tnLst>
-  </p:timing>
-</p:sld>
-</file>
-
-<file path=ppt/slides/slide21.xml><?xml version="1.0" encoding="utf-8"?>
-<p:sld xmlns:a="http://schemas.openxmlformats.org/drawingml/2006/main" xmlns:r="http://schemas.openxmlformats.org/officeDocument/2006/relationships" xmlns:p="http://schemas.openxmlformats.org/presentationml/2006/main">
-  <p:cSld>
-    <p:spTree>
-      <p:nvGrpSpPr>
-        <p:cNvPr id="1" name=""/>
-        <p:cNvGrpSpPr/>
-        <p:nvPr/>
-      </p:nvGrpSpPr>
-      <p:grpSpPr>
-        <a:xfrm>
-          <a:off x="0" y="0"/>
-          <a:ext cx="0" cy="0"/>
-          <a:chOff x="0" y="0"/>
-          <a:chExt cx="0" cy="0"/>
-        </a:xfrm>
-      </p:grpSpPr>
-      <p:sp>
-        <p:nvSpPr>
-          <p:cNvPr id="2" name="Title 1"/>
-          <p:cNvSpPr>
-            <a:spLocks noGrp="1"/>
-          </p:cNvSpPr>
-          <p:nvPr>
-            <p:ph type="title"/>
-          </p:nvPr>
-        </p:nvSpPr>
-        <p:spPr/>
-        <p:txBody>
-          <a:bodyPr/>
-          <a:lstStyle/>
-          <a:p>
-            <a:r>
-              <a:rPr lang="en-US" dirty="0" smtClean="0"/>
-              <a:t>Michael’s Contributions</a:t>
-            </a:r>
-            <a:endParaRPr lang="en-US" dirty="0"/>
-          </a:p>
-        </p:txBody>
-      </p:sp>
-      <p:sp>
-        <p:nvSpPr>
-          <p:cNvPr id="3" name="Content Placeholder 2"/>
-          <p:cNvSpPr>
-            <a:spLocks noGrp="1"/>
-          </p:cNvSpPr>
-          <p:nvPr>
-            <p:ph sz="quarter" idx="13"/>
-          </p:nvPr>
-        </p:nvSpPr>
-        <p:spPr/>
-        <p:txBody>
-          <a:bodyPr/>
-          <a:lstStyle/>
-          <a:p>
-            <a:endParaRPr lang="en-US"/>
-          </a:p>
-        </p:txBody>
-      </p:sp>
-    </p:spTree>
-    <p:extLst>
-      <p:ext uri="{BB962C8B-B14F-4D97-AF65-F5344CB8AC3E}">
-        <p14:creationId xmlns:p14="http://schemas.microsoft.com/office/powerpoint/2010/main" val="2683155291"/>
-      </p:ext>
-    </p:extLst>
-  </p:cSld>
-  <p:clrMapOvr>
-    <a:masterClrMapping/>
-  </p:clrMapOvr>
-  <p:timing>
-    <p:tnLst>
-      <p:par>
-        <p:cTn id="1" dur="indefinite" restart="never" nodeType="tmRoot"/>
-      </p:par>
-    </p:tnLst>
-  </p:timing>
-</p:sld>
-</file>
-
-<file path=ppt/slides/slide22.xml><?xml version="1.0" encoding="utf-8"?>
-<p:sld xmlns:a="http://schemas.openxmlformats.org/drawingml/2006/main" xmlns:r="http://schemas.openxmlformats.org/officeDocument/2006/relationships" xmlns:p="http://schemas.openxmlformats.org/presentationml/2006/main">
-  <p:cSld>
-    <p:spTree>
-      <p:nvGrpSpPr>
-        <p:cNvPr id="1" name=""/>
-        <p:cNvGrpSpPr/>
-        <p:nvPr/>
-      </p:nvGrpSpPr>
-      <p:grpSpPr>
-        <a:xfrm>
-          <a:off x="0" y="0"/>
-          <a:ext cx="0" cy="0"/>
-          <a:chOff x="0" y="0"/>
-          <a:chExt cx="0" cy="0"/>
-        </a:xfrm>
-      </p:grpSpPr>
-      <p:sp>
-        <p:nvSpPr>
-          <p:cNvPr id="2" name="Title 1"/>
-          <p:cNvSpPr>
-            <a:spLocks noGrp="1"/>
-          </p:cNvSpPr>
-          <p:nvPr>
-            <p:ph type="title"/>
-          </p:nvPr>
-        </p:nvSpPr>
-        <p:spPr/>
-        <p:txBody>
-          <a:bodyPr/>
-          <a:lstStyle/>
-          <a:p>
-            <a:r>
-              <a:rPr lang="en-US" dirty="0" smtClean="0"/>
-              <a:t>John’s Contributions</a:t>
-            </a:r>
-            <a:endParaRPr lang="en-US" dirty="0"/>
-          </a:p>
-        </p:txBody>
-      </p:sp>
-      <p:sp>
-        <p:nvSpPr>
-          <p:cNvPr id="3" name="Content Placeholder 2"/>
-          <p:cNvSpPr>
-            <a:spLocks noGrp="1"/>
-          </p:cNvSpPr>
-          <p:nvPr>
-            <p:ph sz="quarter" idx="13"/>
-          </p:nvPr>
-        </p:nvSpPr>
-        <p:spPr/>
-        <p:txBody>
-          <a:bodyPr>
-            <a:normAutofit/>
-          </a:bodyPr>
-          <a:lstStyle/>
-          <a:p>
-            <a:r>
-              <a:rPr lang="en-US" dirty="0" smtClean="0"/>
-              <a:t>Schematic Design: Initial layout, editing, revising, updating.</a:t>
-            </a:r>
-          </a:p>
-          <a:p>
-            <a:r>
-              <a:rPr lang="en-US" dirty="0" smtClean="0"/>
-              <a:t>Layout: stack </a:t>
-            </a:r>
-            <a:r>
-              <a:rPr lang="en-US" dirty="0"/>
-              <a:t>d</a:t>
-            </a:r>
-            <a:r>
-              <a:rPr lang="en-US" dirty="0" smtClean="0"/>
-              <a:t>esign, part placement, layer design, routing, organization, revising updating.</a:t>
-            </a:r>
-          </a:p>
-          <a:p>
-            <a:r>
-              <a:rPr lang="en-US" dirty="0" smtClean="0"/>
-              <a:t>Implementation: oven soldering, hand soldering, assembly</a:t>
-            </a:r>
-          </a:p>
-          <a:p>
-            <a:r>
-              <a:rPr lang="en-US" dirty="0" smtClean="0"/>
-              <a:t>Test:</a:t>
-            </a:r>
-          </a:p>
-          <a:p>
-            <a:r>
-              <a:rPr lang="en-US" dirty="0" smtClean="0"/>
-              <a:t>Documentation:</a:t>
-            </a:r>
-            <a:endParaRPr lang="en-US" dirty="0"/>
-          </a:p>
-        </p:txBody>
-      </p:sp>
-    </p:spTree>
-    <p:extLst>
-      <p:ext uri="{BB962C8B-B14F-4D97-AF65-F5344CB8AC3E}">
-        <p14:creationId xmlns:p14="http://schemas.microsoft.com/office/powerpoint/2010/main" val="928022165"/>
-      </p:ext>
-    </p:extLst>
-  </p:cSld>
-  <p:clrMapOvr>
-    <a:masterClrMapping/>
-  </p:clrMapOvr>
-  <p:timing>
-    <p:tnLst>
-      <p:par>
-        <p:cTn id="1" dur="indefinite" restart="never" nodeType="tmRoot"/>
-      </p:par>
-    </p:tnLst>
-  </p:timing>
-</p:sld>
-</file>
-
 <file path=ppt/slides/slide23.xml><?xml version="1.0" encoding="utf-8"?>
 <p:sld xmlns:a="http://schemas.openxmlformats.org/drawingml/2006/main" xmlns:r="http://schemas.openxmlformats.org/officeDocument/2006/relationships" xmlns:p="http://schemas.openxmlformats.org/presentationml/2006/main">
   <p:cSld>
@@ -5278,7 +5428,7 @@
           <a:p>
             <a:r>
               <a:rPr lang="en-US" dirty="0" smtClean="0"/>
-              <a:t>Cody’s Contributions</a:t>
+              <a:t>Ben’s Contributions</a:t>
             </a:r>
             <a:endParaRPr lang="en-US" dirty="0"/>
           </a:p>
@@ -5296,57 +5446,17 @@
         </p:nvSpPr>
         <p:spPr/>
         <p:txBody>
-          <a:bodyPr>
-            <a:normAutofit/>
-          </a:bodyPr>
-          <a:lstStyle/>
-          <a:p>
-            <a:r>
-              <a:rPr lang="en-US" dirty="0" smtClean="0"/>
-              <a:t>Initial Design: PMIC selection</a:t>
-            </a:r>
-          </a:p>
-          <a:p>
-            <a:r>
-              <a:rPr lang="en-US" dirty="0" smtClean="0"/>
-              <a:t>Schematic: adhered to application notes for USB battery charging and </a:t>
-            </a:r>
-            <a:r>
-              <a:rPr lang="en-US" dirty="0" smtClean="0">
-                <a:sym typeface="Mathematica1"/>
-              </a:rPr>
-              <a:t>C busses</a:t>
-            </a:r>
-            <a:r>
-              <a:rPr lang="en-US" dirty="0" smtClean="0"/>
-              <a:t>, designed GPIO enabled transistor switches, minor parts selection</a:t>
-            </a:r>
-          </a:p>
-          <a:p>
-            <a:r>
-              <a:rPr lang="en-US" dirty="0" smtClean="0"/>
-              <a:t>Parts order and tracking</a:t>
-            </a:r>
-          </a:p>
-          <a:p>
-            <a:r>
-              <a:rPr lang="en-US" dirty="0" smtClean="0"/>
-              <a:t>Major contributor to group homework assignments and documentation</a:t>
-            </a:r>
-            <a:endParaRPr lang="en-US" dirty="0"/>
-          </a:p>
-          <a:p>
-            <a:r>
-              <a:rPr lang="en-US" dirty="0" smtClean="0"/>
-              <a:t>Testing:</a:t>
-            </a:r>
+          <a:bodyPr/>
+          <a:lstStyle/>
+          <a:p>
+            <a:endParaRPr lang="en-US"/>
           </a:p>
         </p:txBody>
       </p:sp>
     </p:spTree>
     <p:extLst>
       <p:ext uri="{BB962C8B-B14F-4D97-AF65-F5344CB8AC3E}">
-        <p14:creationId xmlns:p14="http://schemas.microsoft.com/office/powerpoint/2010/main" val="4208371474"/>
+        <p14:creationId xmlns:p14="http://schemas.microsoft.com/office/powerpoint/2010/main" val="116923094"/>
       </p:ext>
     </p:extLst>
   </p:cSld>
@@ -5397,7 +5507,7 @@
           <a:p>
             <a:r>
               <a:rPr lang="en-US" dirty="0" smtClean="0"/>
-              <a:t>Ben’s Lessons Learned</a:t>
+              <a:t>Michael’s Contributions</a:t>
             </a:r>
             <a:endParaRPr lang="en-US" dirty="0"/>
           </a:p>
@@ -5425,7 +5535,7 @@
     </p:spTree>
     <p:extLst>
       <p:ext uri="{BB962C8B-B14F-4D97-AF65-F5344CB8AC3E}">
-        <p14:creationId xmlns:p14="http://schemas.microsoft.com/office/powerpoint/2010/main" val="1239360693"/>
+        <p14:creationId xmlns:p14="http://schemas.microsoft.com/office/powerpoint/2010/main" val="2683155291"/>
       </p:ext>
     </p:extLst>
   </p:cSld>
@@ -5476,7 +5586,7 @@
           <a:p>
             <a:r>
               <a:rPr lang="en-US" dirty="0" smtClean="0"/>
-              <a:t>Michael’s Lessons Learned</a:t>
+              <a:t>John’s Contributions</a:t>
             </a:r>
             <a:endParaRPr lang="en-US" dirty="0"/>
           </a:p>
@@ -5494,17 +5604,95 @@
         </p:nvSpPr>
         <p:spPr/>
         <p:txBody>
-          <a:bodyPr/>
-          <a:lstStyle/>
-          <a:p>
-            <a:endParaRPr lang="en-US"/>
+          <a:bodyPr>
+            <a:normAutofit/>
+          </a:bodyPr>
+          <a:lstStyle/>
+          <a:p>
+            <a:pPr>
+              <a:spcBef>
+                <a:spcPts val="1200"/>
+              </a:spcBef>
+              <a:spcAft>
+                <a:spcPts val="1200"/>
+              </a:spcAft>
+            </a:pPr>
+            <a:r>
+              <a:rPr lang="en-US" dirty="0" smtClean="0"/>
+              <a:t>Schematic Design: Initial layout, editing, revising, updating.</a:t>
+            </a:r>
+          </a:p>
+          <a:p>
+            <a:pPr>
+              <a:spcBef>
+                <a:spcPts val="1200"/>
+              </a:spcBef>
+              <a:spcAft>
+                <a:spcPts val="1200"/>
+              </a:spcAft>
+            </a:pPr>
+            <a:r>
+              <a:rPr lang="en-US" dirty="0" smtClean="0"/>
+              <a:t>Layout: stack </a:t>
+            </a:r>
+            <a:r>
+              <a:rPr lang="en-US" dirty="0"/>
+              <a:t>d</a:t>
+            </a:r>
+            <a:r>
+              <a:rPr lang="en-US" dirty="0" smtClean="0"/>
+              <a:t>esign, part placement, layer design, routing, organization, revising updating.</a:t>
+            </a:r>
+          </a:p>
+          <a:p>
+            <a:pPr>
+              <a:spcBef>
+                <a:spcPts val="1200"/>
+              </a:spcBef>
+              <a:spcAft>
+                <a:spcPts val="1200"/>
+              </a:spcAft>
+            </a:pPr>
+            <a:r>
+              <a:rPr lang="en-US" dirty="0" smtClean="0"/>
+              <a:t>Implementation: oven soldering, hand soldering, assembly</a:t>
+            </a:r>
+          </a:p>
+          <a:p>
+            <a:pPr>
+              <a:spcBef>
+                <a:spcPts val="1200"/>
+              </a:spcBef>
+              <a:spcAft>
+                <a:spcPts val="1200"/>
+              </a:spcAft>
+            </a:pPr>
+            <a:r>
+              <a:rPr lang="en-US" dirty="0" smtClean="0"/>
+              <a:t>Test:</a:t>
+            </a:r>
+          </a:p>
+          <a:p>
+            <a:pPr>
+              <a:spcBef>
+                <a:spcPts val="1200"/>
+              </a:spcBef>
+              <a:spcAft>
+                <a:spcPts val="1200"/>
+              </a:spcAft>
+            </a:pPr>
+            <a:r>
+              <a:rPr lang="en-US" dirty="0" smtClean="0"/>
+              <a:t>Documentation:</a:t>
+            </a:r>
+            <a:endParaRPr lang="en-US" dirty="0"/>
           </a:p>
         </p:txBody>
       </p:sp>
     </p:spTree>
     <p:extLst>
       <p:ext uri="{BB962C8B-B14F-4D97-AF65-F5344CB8AC3E}">
-        <p14:creationId xmlns:p14="http://schemas.microsoft.com/office/powerpoint/2010/main" val="2657856652"/>
+        <p14:creationId xmlns:p14="http://schemas.microsoft.com/office/powerpoint/2010/main" val="928022165"/>
       </p:ext>
     </p:extLst>
   </p:cSld>
@@ -5555,7 +5743,7 @@
           <a:p>
             <a:r>
               <a:rPr lang="en-US" dirty="0" smtClean="0"/>
-              <a:t>John’s Lessons Learned</a:t>
+              <a:t>Cody’s Contributions</a:t>
             </a:r>
             <a:endParaRPr lang="en-US" dirty="0"/>
           </a:p>
@@ -5578,58 +5766,92 @@
           </a:bodyPr>
           <a:lstStyle/>
           <a:p>
-            <a:r>
-              <a:rPr lang="en-US" dirty="0" smtClean="0"/>
-              <a:t>Getting started early sets up the team for success.</a:t>
-            </a:r>
-          </a:p>
-          <a:p>
-            <a:r>
-              <a:rPr lang="en-US" dirty="0" smtClean="0"/>
-              <a:t>Problems will occur preparing for them is possible.</a:t>
-            </a:r>
-          </a:p>
-          <a:p>
-            <a:r>
-              <a:rPr lang="en-US" dirty="0" smtClean="0"/>
-              <a:t>When it is not possible to prepare for a problem grace is required to deal with it.</a:t>
-            </a:r>
-          </a:p>
-          <a:p>
-            <a:r>
-              <a:rPr lang="en-US" dirty="0" smtClean="0"/>
-              <a:t>Eagle Cad is a good free program.</a:t>
-            </a:r>
-          </a:p>
-          <a:p>
-            <a:r>
-              <a:rPr lang="en-US" dirty="0" smtClean="0"/>
-              <a:t>Bulk board orders are cheaper</a:t>
-            </a:r>
-          </a:p>
-          <a:p>
-            <a:r>
-              <a:rPr lang="en-US" dirty="0" smtClean="0"/>
-              <a:t>The EPL is an awesome but very </a:t>
-            </a:r>
-            <a:r>
-              <a:rPr lang="en-US" smtClean="0"/>
-              <a:t>small place to be</a:t>
-            </a:r>
-            <a:endParaRPr lang="en-US" dirty="0" smtClean="0"/>
-          </a:p>
-          <a:p>
-            <a:endParaRPr lang="en-US" dirty="0" smtClean="0"/>
-          </a:p>
-          <a:p>
+            <a:pPr>
+              <a:spcBef>
+                <a:spcPts val="1200"/>
+              </a:spcBef>
+              <a:spcAft>
+                <a:spcPts val="1200"/>
+              </a:spcAft>
+            </a:pPr>
+            <a:r>
+              <a:rPr lang="en-US" dirty="0" smtClean="0"/>
+              <a:t>Initial Design: PMIC selection</a:t>
+            </a:r>
+          </a:p>
+          <a:p>
+            <a:pPr>
+              <a:spcBef>
+                <a:spcPts val="1200"/>
+              </a:spcBef>
+              <a:spcAft>
+                <a:spcPts val="1200"/>
+              </a:spcAft>
+            </a:pPr>
+            <a:r>
+              <a:rPr lang="en-US" dirty="0" smtClean="0"/>
+              <a:t>Schematic: adhered to application notes for USB battery charging and </a:t>
+            </a:r>
+            <a:r>
+              <a:rPr lang="en-US" dirty="0" smtClean="0">
+                <a:sym typeface="Mathematica1"/>
+              </a:rPr>
+              <a:t>C busses</a:t>
+            </a:r>
+            <a:r>
+              <a:rPr lang="en-US" dirty="0" smtClean="0"/>
+              <a:t>, designed GPIO enabled transistor switches, minor parts selection</a:t>
+            </a:r>
+          </a:p>
+          <a:p>
+            <a:pPr>
+              <a:spcBef>
+                <a:spcPts val="1200"/>
+              </a:spcBef>
+              <a:spcAft>
+                <a:spcPts val="1200"/>
+              </a:spcAft>
+            </a:pPr>
+            <a:r>
+              <a:rPr lang="en-US" dirty="0" smtClean="0"/>
+              <a:t>Parts order and tracking</a:t>
+            </a:r>
+          </a:p>
+          <a:p>
+            <a:pPr>
+              <a:spcBef>
+                <a:spcPts val="1200"/>
+              </a:spcBef>
+              <a:spcAft>
+                <a:spcPts val="1200"/>
+              </a:spcAft>
+            </a:pPr>
+            <a:r>
+              <a:rPr lang="en-US" dirty="0" smtClean="0"/>
+              <a:t>Major contributor to group homework assignments and documentation</a:t>
+            </a:r>
             <a:endParaRPr lang="en-US" dirty="0"/>
+          </a:p>
+          <a:p>
+            <a:pPr>
+              <a:spcBef>
+                <a:spcPts val="1200"/>
+              </a:spcBef>
+              <a:spcAft>
+                <a:spcPts val="1200"/>
+              </a:spcAft>
+            </a:pPr>
+            <a:r>
+              <a:rPr lang="en-US" dirty="0" smtClean="0"/>
+              <a:t>Testing:</a:t>
+            </a:r>
           </a:p>
         </p:txBody>
       </p:sp>
     </p:spTree>
     <p:extLst>
       <p:ext uri="{BB962C8B-B14F-4D97-AF65-F5344CB8AC3E}">
-        <p14:creationId xmlns:p14="http://schemas.microsoft.com/office/powerpoint/2010/main" val="1276458641"/>
+        <p14:creationId xmlns:p14="http://schemas.microsoft.com/office/powerpoint/2010/main" val="4208371474"/>
       </p:ext>
     </p:extLst>
   </p:cSld>
@@ -5680,6 +5902,433 @@
           <a:p>
             <a:r>
               <a:rPr lang="en-US" dirty="0" smtClean="0"/>
+              <a:t>Ben’s Lessons Learned</a:t>
+            </a:r>
+            <a:endParaRPr lang="en-US" dirty="0"/>
+          </a:p>
+        </p:txBody>
+      </p:sp>
+      <p:sp>
+        <p:nvSpPr>
+          <p:cNvPr id="3" name="Content Placeholder 2"/>
+          <p:cNvSpPr>
+            <a:spLocks noGrp="1"/>
+          </p:cNvSpPr>
+          <p:nvPr>
+            <p:ph sz="quarter" idx="13"/>
+          </p:nvPr>
+        </p:nvSpPr>
+        <p:spPr/>
+        <p:txBody>
+          <a:bodyPr/>
+          <a:lstStyle/>
+          <a:p>
+            <a:endParaRPr lang="en-US"/>
+          </a:p>
+        </p:txBody>
+      </p:sp>
+    </p:spTree>
+    <p:extLst>
+      <p:ext uri="{BB962C8B-B14F-4D97-AF65-F5344CB8AC3E}">
+        <p14:creationId xmlns:p14="http://schemas.microsoft.com/office/powerpoint/2010/main" val="1239360693"/>
+      </p:ext>
+    </p:extLst>
+  </p:cSld>
+  <p:clrMapOvr>
+    <a:masterClrMapping/>
+  </p:clrMapOvr>
+  <p:timing>
+    <p:tnLst>
+      <p:par>
+        <p:cTn id="1" dur="indefinite" restart="never" nodeType="tmRoot"/>
+      </p:par>
+    </p:tnLst>
+  </p:timing>
+</p:sld>
+</file>
+
+<file path=ppt/slides/slide28.xml><?xml version="1.0" encoding="utf-8"?>
+<p:sld xmlns:a="http://schemas.openxmlformats.org/drawingml/2006/main" xmlns:r="http://schemas.openxmlformats.org/officeDocument/2006/relationships" xmlns:p="http://schemas.openxmlformats.org/presentationml/2006/main">
+  <p:cSld>
+    <p:spTree>
+      <p:nvGrpSpPr>
+        <p:cNvPr id="1" name=""/>
+        <p:cNvGrpSpPr/>
+        <p:nvPr/>
+      </p:nvGrpSpPr>
+      <p:grpSpPr>
+        <a:xfrm>
+          <a:off x="0" y="0"/>
+          <a:ext cx="0" cy="0"/>
+          <a:chOff x="0" y="0"/>
+          <a:chExt cx="0" cy="0"/>
+        </a:xfrm>
+      </p:grpSpPr>
+      <p:sp>
+        <p:nvSpPr>
+          <p:cNvPr id="2" name="Title 1"/>
+          <p:cNvSpPr>
+            <a:spLocks noGrp="1"/>
+          </p:cNvSpPr>
+          <p:nvPr>
+            <p:ph type="title"/>
+          </p:nvPr>
+        </p:nvSpPr>
+        <p:spPr/>
+        <p:txBody>
+          <a:bodyPr/>
+          <a:lstStyle/>
+          <a:p>
+            <a:r>
+              <a:rPr lang="en-US" dirty="0" smtClean="0"/>
+              <a:t>Michael’s Lessons Learned</a:t>
+            </a:r>
+            <a:endParaRPr lang="en-US" dirty="0"/>
+          </a:p>
+        </p:txBody>
+      </p:sp>
+      <p:sp>
+        <p:nvSpPr>
+          <p:cNvPr id="3" name="Content Placeholder 2"/>
+          <p:cNvSpPr>
+            <a:spLocks noGrp="1"/>
+          </p:cNvSpPr>
+          <p:nvPr>
+            <p:ph sz="quarter" idx="13"/>
+          </p:nvPr>
+        </p:nvSpPr>
+        <p:spPr/>
+        <p:txBody>
+          <a:bodyPr/>
+          <a:lstStyle/>
+          <a:p>
+            <a:endParaRPr lang="en-US"/>
+          </a:p>
+        </p:txBody>
+      </p:sp>
+    </p:spTree>
+    <p:extLst>
+      <p:ext uri="{BB962C8B-B14F-4D97-AF65-F5344CB8AC3E}">
+        <p14:creationId xmlns:p14="http://schemas.microsoft.com/office/powerpoint/2010/main" val="2657856652"/>
+      </p:ext>
+    </p:extLst>
+  </p:cSld>
+  <p:clrMapOvr>
+    <a:masterClrMapping/>
+  </p:clrMapOvr>
+  <p:timing>
+    <p:tnLst>
+      <p:par>
+        <p:cTn id="1" dur="indefinite" restart="never" nodeType="tmRoot"/>
+      </p:par>
+    </p:tnLst>
+  </p:timing>
+</p:sld>
+</file>
+
+<file path=ppt/slides/slide29.xml><?xml version="1.0" encoding="utf-8"?>
+<p:sld xmlns:a="http://schemas.openxmlformats.org/drawingml/2006/main" xmlns:r="http://schemas.openxmlformats.org/officeDocument/2006/relationships" xmlns:p="http://schemas.openxmlformats.org/presentationml/2006/main">
+  <p:cSld>
+    <p:spTree>
+      <p:nvGrpSpPr>
+        <p:cNvPr id="1" name=""/>
+        <p:cNvGrpSpPr/>
+        <p:nvPr/>
+      </p:nvGrpSpPr>
+      <p:grpSpPr>
+        <a:xfrm>
+          <a:off x="0" y="0"/>
+          <a:ext cx="0" cy="0"/>
+          <a:chOff x="0" y="0"/>
+          <a:chExt cx="0" cy="0"/>
+        </a:xfrm>
+      </p:grpSpPr>
+      <p:sp>
+        <p:nvSpPr>
+          <p:cNvPr id="2" name="Title 1"/>
+          <p:cNvSpPr>
+            <a:spLocks noGrp="1"/>
+          </p:cNvSpPr>
+          <p:nvPr>
+            <p:ph type="title"/>
+          </p:nvPr>
+        </p:nvSpPr>
+        <p:spPr/>
+        <p:txBody>
+          <a:bodyPr/>
+          <a:lstStyle/>
+          <a:p>
+            <a:r>
+              <a:rPr lang="en-US" dirty="0" smtClean="0"/>
+              <a:t>John’s Lessons Learned</a:t>
+            </a:r>
+            <a:endParaRPr lang="en-US" dirty="0"/>
+          </a:p>
+        </p:txBody>
+      </p:sp>
+      <p:sp>
+        <p:nvSpPr>
+          <p:cNvPr id="3" name="Content Placeholder 2"/>
+          <p:cNvSpPr>
+            <a:spLocks noGrp="1"/>
+          </p:cNvSpPr>
+          <p:nvPr>
+            <p:ph sz="quarter" idx="13"/>
+          </p:nvPr>
+        </p:nvSpPr>
+        <p:spPr/>
+        <p:txBody>
+          <a:bodyPr>
+            <a:normAutofit/>
+          </a:bodyPr>
+          <a:lstStyle/>
+          <a:p>
+            <a:pPr>
+              <a:spcBef>
+                <a:spcPts val="1200"/>
+              </a:spcBef>
+              <a:spcAft>
+                <a:spcPts val="1200"/>
+              </a:spcAft>
+            </a:pPr>
+            <a:r>
+              <a:rPr lang="en-US" dirty="0" smtClean="0"/>
+              <a:t>Getting started early sets up the team for success.</a:t>
+            </a:r>
+          </a:p>
+          <a:p>
+            <a:pPr>
+              <a:spcBef>
+                <a:spcPts val="1200"/>
+              </a:spcBef>
+              <a:spcAft>
+                <a:spcPts val="1200"/>
+              </a:spcAft>
+            </a:pPr>
+            <a:r>
+              <a:rPr lang="en-US" dirty="0" smtClean="0"/>
+              <a:t>Problems will occur preparing for them is possible.</a:t>
+            </a:r>
+          </a:p>
+          <a:p>
+            <a:pPr>
+              <a:spcBef>
+                <a:spcPts val="1200"/>
+              </a:spcBef>
+              <a:spcAft>
+                <a:spcPts val="1200"/>
+              </a:spcAft>
+            </a:pPr>
+            <a:r>
+              <a:rPr lang="en-US" dirty="0" smtClean="0"/>
+              <a:t>When it is not possible to prepare for a problem grace is required to deal with it.</a:t>
+            </a:r>
+          </a:p>
+          <a:p>
+            <a:pPr>
+              <a:spcBef>
+                <a:spcPts val="1200"/>
+              </a:spcBef>
+              <a:spcAft>
+                <a:spcPts val="1200"/>
+              </a:spcAft>
+            </a:pPr>
+            <a:r>
+              <a:rPr lang="en-US" dirty="0" smtClean="0"/>
+              <a:t>Eagle Cad is a good free program.</a:t>
+            </a:r>
+          </a:p>
+          <a:p>
+            <a:pPr>
+              <a:spcBef>
+                <a:spcPts val="1200"/>
+              </a:spcBef>
+              <a:spcAft>
+                <a:spcPts val="1200"/>
+              </a:spcAft>
+            </a:pPr>
+            <a:r>
+              <a:rPr lang="en-US" dirty="0" smtClean="0"/>
+              <a:t>Bulk board orders are cheaper</a:t>
+            </a:r>
+          </a:p>
+          <a:p>
+            <a:pPr>
+              <a:spcBef>
+                <a:spcPts val="1200"/>
+              </a:spcBef>
+              <a:spcAft>
+                <a:spcPts val="1200"/>
+              </a:spcAft>
+            </a:pPr>
+            <a:r>
+              <a:rPr lang="en-US" dirty="0" smtClean="0"/>
+              <a:t>The EPL is an awesome but very small place to be</a:t>
+            </a:r>
+          </a:p>
+          <a:p>
+            <a:endParaRPr lang="en-US" dirty="0" smtClean="0"/>
+          </a:p>
+          <a:p>
+            <a:endParaRPr lang="en-US" dirty="0"/>
+          </a:p>
+        </p:txBody>
+      </p:sp>
+    </p:spTree>
+    <p:extLst>
+      <p:ext uri="{BB962C8B-B14F-4D97-AF65-F5344CB8AC3E}">
+        <p14:creationId xmlns:p14="http://schemas.microsoft.com/office/powerpoint/2010/main" val="1276458641"/>
+      </p:ext>
+    </p:extLst>
+  </p:cSld>
+  <p:clrMapOvr>
+    <a:masterClrMapping/>
+  </p:clrMapOvr>
+  <p:timing>
+    <p:tnLst>
+      <p:par>
+        <p:cTn id="1" dur="indefinite" restart="never" nodeType="tmRoot"/>
+      </p:par>
+    </p:tnLst>
+  </p:timing>
+</p:sld>
+</file>
+
+<file path=ppt/slides/slide3.xml><?xml version="1.0" encoding="utf-8"?>
+<p:sld xmlns:a="http://schemas.openxmlformats.org/drawingml/2006/main" xmlns:r="http://schemas.openxmlformats.org/officeDocument/2006/relationships" xmlns:p="http://schemas.openxmlformats.org/presentationml/2006/main">
+  <p:cSld>
+    <p:spTree>
+      <p:nvGrpSpPr>
+        <p:cNvPr id="1" name=""/>
+        <p:cNvGrpSpPr/>
+        <p:nvPr/>
+      </p:nvGrpSpPr>
+      <p:grpSpPr>
+        <a:xfrm>
+          <a:off x="0" y="0"/>
+          <a:ext cx="0" cy="0"/>
+          <a:chOff x="0" y="0"/>
+          <a:chExt cx="0" cy="0"/>
+        </a:xfrm>
+      </p:grpSpPr>
+      <p:sp>
+        <p:nvSpPr>
+          <p:cNvPr id="2" name="Title 1"/>
+          <p:cNvSpPr>
+            <a:spLocks noGrp="1"/>
+          </p:cNvSpPr>
+          <p:nvPr>
+            <p:ph type="title"/>
+          </p:nvPr>
+        </p:nvSpPr>
+        <p:spPr/>
+        <p:txBody>
+          <a:bodyPr/>
+          <a:lstStyle/>
+          <a:p>
+            <a:r>
+              <a:rPr lang="en-US" dirty="0" smtClean="0"/>
+              <a:t>Motivation</a:t>
+            </a:r>
+            <a:endParaRPr lang="en-US" dirty="0"/>
+          </a:p>
+        </p:txBody>
+      </p:sp>
+      <p:sp>
+        <p:nvSpPr>
+          <p:cNvPr id="3" name="Content Placeholder 2"/>
+          <p:cNvSpPr>
+            <a:spLocks noGrp="1"/>
+          </p:cNvSpPr>
+          <p:nvPr>
+            <p:ph sz="quarter" idx="13"/>
+          </p:nvPr>
+        </p:nvSpPr>
+        <p:spPr/>
+        <p:txBody>
+          <a:bodyPr/>
+          <a:lstStyle/>
+          <a:p>
+            <a:r>
+              <a:rPr lang="en-US" dirty="0" smtClean="0"/>
+              <a:t>The value is in the USB interface for Robot</a:t>
+            </a:r>
+          </a:p>
+          <a:p>
+            <a:endParaRPr lang="en-US" dirty="0" smtClean="0"/>
+          </a:p>
+          <a:p>
+            <a:r>
+              <a:rPr lang="en-US" dirty="0" smtClean="0"/>
+              <a:t>Alternative compass solutions are analog or phone based with the primary user being Human.</a:t>
+            </a:r>
+          </a:p>
+          <a:p>
+            <a:endParaRPr lang="en-US" dirty="0" smtClean="0"/>
+          </a:p>
+          <a:p>
+            <a:r>
+              <a:rPr lang="en-US" dirty="0" smtClean="0"/>
+              <a:t>Provides something that was not accessible at relatively low cost before.</a:t>
+            </a:r>
+            <a:endParaRPr lang="en-US" dirty="0"/>
+          </a:p>
+        </p:txBody>
+      </p:sp>
+    </p:spTree>
+    <p:extLst>
+      <p:ext uri="{BB962C8B-B14F-4D97-AF65-F5344CB8AC3E}">
+        <p14:creationId xmlns:p14="http://schemas.microsoft.com/office/powerpoint/2010/main" val="1981554723"/>
+      </p:ext>
+    </p:extLst>
+  </p:cSld>
+  <p:clrMapOvr>
+    <a:masterClrMapping/>
+  </p:clrMapOvr>
+  <p:timing>
+    <p:tnLst>
+      <p:par>
+        <p:cTn id="1" dur="indefinite" restart="never" nodeType="tmRoot"/>
+      </p:par>
+    </p:tnLst>
+  </p:timing>
+</p:sld>
+</file>
+
+<file path=ppt/slides/slide30.xml><?xml version="1.0" encoding="utf-8"?>
+<p:sld xmlns:a="http://schemas.openxmlformats.org/drawingml/2006/main" xmlns:r="http://schemas.openxmlformats.org/officeDocument/2006/relationships" xmlns:p="http://schemas.openxmlformats.org/presentationml/2006/main">
+  <p:cSld>
+    <p:spTree>
+      <p:nvGrpSpPr>
+        <p:cNvPr id="1" name=""/>
+        <p:cNvGrpSpPr/>
+        <p:nvPr/>
+      </p:nvGrpSpPr>
+      <p:grpSpPr>
+        <a:xfrm>
+          <a:off x="0" y="0"/>
+          <a:ext cx="0" cy="0"/>
+          <a:chOff x="0" y="0"/>
+          <a:chExt cx="0" cy="0"/>
+        </a:xfrm>
+      </p:grpSpPr>
+      <p:sp>
+        <p:nvSpPr>
+          <p:cNvPr id="2" name="Title 1"/>
+          <p:cNvSpPr>
+            <a:spLocks noGrp="1"/>
+          </p:cNvSpPr>
+          <p:nvPr>
+            <p:ph type="title"/>
+          </p:nvPr>
+        </p:nvSpPr>
+        <p:spPr/>
+        <p:txBody>
+          <a:bodyPr/>
+          <a:lstStyle/>
+          <a:p>
+            <a:r>
+              <a:rPr lang="en-US" dirty="0" smtClean="0"/>
               <a:t>Cody’s Lessons Learned</a:t>
             </a:r>
             <a:endParaRPr lang="en-US" dirty="0"/>
@@ -5701,30 +6350,70 @@
           <a:bodyPr/>
           <a:lstStyle/>
           <a:p>
+            <a:pPr>
+              <a:spcBef>
+                <a:spcPts val="1200"/>
+              </a:spcBef>
+              <a:spcAft>
+                <a:spcPts val="1200"/>
+              </a:spcAft>
+            </a:pPr>
             <a:r>
               <a:rPr lang="en-US" dirty="0" smtClean="0"/>
               <a:t>Professional grade design and construction</a:t>
             </a:r>
           </a:p>
           <a:p>
+            <a:pPr>
+              <a:spcBef>
+                <a:spcPts val="1200"/>
+              </a:spcBef>
+              <a:spcAft>
+                <a:spcPts val="1200"/>
+              </a:spcAft>
+            </a:pPr>
             <a:r>
               <a:rPr lang="en-US" dirty="0" smtClean="0"/>
               <a:t>Constant communication is key to success</a:t>
             </a:r>
           </a:p>
           <a:p>
+            <a:pPr>
+              <a:spcBef>
+                <a:spcPts val="1200"/>
+              </a:spcBef>
+              <a:spcAft>
+                <a:spcPts val="1200"/>
+              </a:spcAft>
+            </a:pPr>
             <a:r>
               <a:rPr lang="en-US" dirty="0" smtClean="0"/>
               <a:t>Step up when the team needs you to</a:t>
             </a:r>
           </a:p>
           <a:p>
+            <a:pPr>
+              <a:spcBef>
+                <a:spcPts val="1200"/>
+              </a:spcBef>
+              <a:spcAft>
+                <a:spcPts val="1200"/>
+              </a:spcAft>
+            </a:pPr>
             <a:r>
               <a:rPr lang="en-US" dirty="0" smtClean="0"/>
               <a:t>Verify all parts are ordered more than once</a:t>
             </a:r>
           </a:p>
           <a:p>
+            <a:pPr>
+              <a:spcBef>
+                <a:spcPts val="1200"/>
+              </a:spcBef>
+              <a:spcAft>
+                <a:spcPts val="1200"/>
+              </a:spcAft>
+            </a:pPr>
             <a:r>
               <a:rPr lang="en-US" dirty="0" smtClean="0"/>
               <a:t>Don’t be complacent!</a:t>
@@ -5755,7 +6444,7 @@
 </p:sld>
 </file>
 
-<file path=ppt/slides/slide28.xml><?xml version="1.0" encoding="utf-8"?>
+<file path=ppt/slides/slide31.xml><?xml version="1.0" encoding="utf-8"?>
 <p:sld xmlns:a="http://schemas.openxmlformats.org/drawingml/2006/main" xmlns:r="http://schemas.openxmlformats.org/officeDocument/2006/relationships" xmlns:p="http://schemas.openxmlformats.org/presentationml/2006/main">
   <p:cSld>
     <p:spTree>
@@ -5870,107 +6559,6 @@
 </p:sld>
 </file>
 
-<file path=ppt/slides/slide3.xml><?xml version="1.0" encoding="utf-8"?>
-<p:sld xmlns:a="http://schemas.openxmlformats.org/drawingml/2006/main" xmlns:r="http://schemas.openxmlformats.org/officeDocument/2006/relationships" xmlns:p="http://schemas.openxmlformats.org/presentationml/2006/main">
-  <p:cSld>
-    <p:spTree>
-      <p:nvGrpSpPr>
-        <p:cNvPr id="1" name=""/>
-        <p:cNvGrpSpPr/>
-        <p:nvPr/>
-      </p:nvGrpSpPr>
-      <p:grpSpPr>
-        <a:xfrm>
-          <a:off x="0" y="0"/>
-          <a:ext cx="0" cy="0"/>
-          <a:chOff x="0" y="0"/>
-          <a:chExt cx="0" cy="0"/>
-        </a:xfrm>
-      </p:grpSpPr>
-      <p:sp>
-        <p:nvSpPr>
-          <p:cNvPr id="2" name="Title 1"/>
-          <p:cNvSpPr>
-            <a:spLocks noGrp="1"/>
-          </p:cNvSpPr>
-          <p:nvPr>
-            <p:ph type="title"/>
-          </p:nvPr>
-        </p:nvSpPr>
-        <p:spPr/>
-        <p:txBody>
-          <a:bodyPr/>
-          <a:lstStyle/>
-          <a:p>
-            <a:r>
-              <a:rPr lang="en-US" dirty="0" smtClean="0"/>
-              <a:t>Motivation</a:t>
-            </a:r>
-            <a:endParaRPr lang="en-US" dirty="0"/>
-          </a:p>
-        </p:txBody>
-      </p:sp>
-      <p:sp>
-        <p:nvSpPr>
-          <p:cNvPr id="3" name="Content Placeholder 2"/>
-          <p:cNvSpPr>
-            <a:spLocks noGrp="1"/>
-          </p:cNvSpPr>
-          <p:nvPr>
-            <p:ph sz="quarter" idx="13"/>
-          </p:nvPr>
-        </p:nvSpPr>
-        <p:spPr/>
-        <p:txBody>
-          <a:bodyPr/>
-          <a:lstStyle/>
-          <a:p>
-            <a:r>
-              <a:rPr lang="en-US" dirty="0" smtClean="0"/>
-              <a:t>The value is in the USB interface for Robot</a:t>
-            </a:r>
-          </a:p>
-          <a:p>
-            <a:endParaRPr lang="en-US" dirty="0" smtClean="0"/>
-          </a:p>
-          <a:p>
-            <a:r>
-              <a:rPr lang="en-US" dirty="0" smtClean="0"/>
-              <a:t>Alternative compass solutions are analog or phone based with the primary user being Human.</a:t>
-            </a:r>
-          </a:p>
-          <a:p>
-            <a:endParaRPr lang="en-US" dirty="0" smtClean="0"/>
-          </a:p>
-          <a:p>
-            <a:r>
-              <a:rPr lang="en-US" dirty="0" smtClean="0"/>
-              <a:t>Provides something that was not accessible at relatively low cost before.</a:t>
-            </a:r>
-            <a:endParaRPr lang="en-US" dirty="0"/>
-          </a:p>
-        </p:txBody>
-      </p:sp>
-    </p:spTree>
-    <p:extLst>
-      <p:ext uri="{BB962C8B-B14F-4D97-AF65-F5344CB8AC3E}">
-        <p14:creationId xmlns:p14="http://schemas.microsoft.com/office/powerpoint/2010/main" val="1981554723"/>
-      </p:ext>
-    </p:extLst>
-  </p:cSld>
-  <p:clrMapOvr>
-    <a:masterClrMapping/>
-  </p:clrMapOvr>
-  <p:timing>
-    <p:tnLst>
-      <p:par>
-        <p:cTn id="1" dur="indefinite" restart="never" nodeType="tmRoot"/>
-      </p:par>
-    </p:tnLst>
-  </p:timing>
-</p:sld>
-</file>
-
 <file path=ppt/slides/slide4.xml><?xml version="1.0" encoding="utf-8"?>
 <p:sld xmlns:a="http://schemas.openxmlformats.org/drawingml/2006/main" xmlns:r="http://schemas.openxmlformats.org/officeDocument/2006/relationships" xmlns:p="http://schemas.openxmlformats.org/presentationml/2006/main">
   <p:cSld>
@@ -6278,30 +6866,70 @@
             </a:r>
           </a:p>
           <a:p>
+            <a:pPr>
+              <a:spcBef>
+                <a:spcPts val="1200"/>
+              </a:spcBef>
+              <a:spcAft>
+                <a:spcPts val="1200"/>
+              </a:spcAft>
+            </a:pPr>
             <a:r>
               <a:rPr lang="en-US" dirty="0" smtClean="0"/>
               <a:t>Have one or more inputs or sensors</a:t>
             </a:r>
           </a:p>
           <a:p>
+            <a:pPr>
+              <a:spcBef>
+                <a:spcPts val="1200"/>
+              </a:spcBef>
+              <a:spcAft>
+                <a:spcPts val="1200"/>
+              </a:spcAft>
+            </a:pPr>
             <a:r>
               <a:rPr lang="en-US" dirty="0" smtClean="0"/>
               <a:t>Have one or more outputs or transducers</a:t>
             </a:r>
           </a:p>
           <a:p>
+            <a:pPr>
+              <a:spcBef>
+                <a:spcPts val="1200"/>
+              </a:spcBef>
+              <a:spcAft>
+                <a:spcPts val="1200"/>
+              </a:spcAft>
+            </a:pPr>
             <a:r>
               <a:rPr lang="en-US" dirty="0" smtClean="0"/>
               <a:t>Have one or more processing module</a:t>
             </a:r>
           </a:p>
           <a:p>
+            <a:pPr>
+              <a:spcBef>
+                <a:spcPts val="1200"/>
+              </a:spcBef>
+              <a:spcAft>
+                <a:spcPts val="1200"/>
+              </a:spcAft>
+            </a:pPr>
             <a:r>
               <a:rPr lang="en-US" dirty="0" smtClean="0"/>
               <a:t>Use a 2-layer PCB</a:t>
             </a:r>
           </a:p>
           <a:p>
+            <a:pPr>
+              <a:spcBef>
+                <a:spcPts val="1200"/>
+              </a:spcBef>
+              <a:spcAft>
+                <a:spcPts val="1200"/>
+              </a:spcAft>
+            </a:pPr>
             <a:r>
               <a:rPr lang="en-US" dirty="0" smtClean="0"/>
               <a:t>Use components that can be hand soldered or easily soldered in a crude reflow oven</a:t>
@@ -6396,38 +7024,70 @@
             </a:r>
           </a:p>
           <a:p>
+            <a:pPr>
+              <a:spcBef>
+                <a:spcPts val="1200"/>
+              </a:spcBef>
+              <a:spcAft>
+                <a:spcPts val="1200"/>
+              </a:spcAft>
+            </a:pPr>
             <a:r>
               <a:rPr lang="en-US" dirty="0" smtClean="0"/>
               <a:t>Be accurate to within 5° of true orientation</a:t>
             </a:r>
           </a:p>
           <a:p>
+            <a:pPr>
+              <a:spcBef>
+                <a:spcPts val="1200"/>
+              </a:spcBef>
+              <a:spcAft>
+                <a:spcPts val="1200"/>
+              </a:spcAft>
+            </a:pPr>
             <a:r>
               <a:rPr lang="en-US" dirty="0" smtClean="0"/>
               <a:t>Have a switch to power on the device and be ready within a short period of time</a:t>
             </a:r>
           </a:p>
           <a:p>
-            <a:r>
-              <a:rPr lang="en-US" dirty="0" smtClean="0"/>
-              <a:t>Output on a display a </a:t>
-            </a:r>
-            <a:r>
-              <a:rPr lang="en-US" dirty="0" smtClean="0"/>
-              <a:t>heading either with a compass face or with letters (i.e. “NNW”) as well as a numerical value in degrees</a:t>
-            </a:r>
-          </a:p>
-          <a:p>
-            <a:r>
-              <a:rPr lang="en-US" dirty="0" smtClean="0"/>
-              <a:t>Be prepared for software </a:t>
-            </a:r>
-            <a:r>
-              <a:rPr lang="en-US" dirty="0" smtClean="0"/>
-              <a:t>updates</a:t>
-            </a:r>
-          </a:p>
-          <a:p>
+            <a:pPr>
+              <a:spcBef>
+                <a:spcPts val="1200"/>
+              </a:spcBef>
+              <a:spcAft>
+                <a:spcPts val="1200"/>
+              </a:spcAft>
+            </a:pPr>
+            <a:r>
+              <a:rPr lang="en-US" dirty="0" smtClean="0"/>
+              <a:t>Output on a display a heading either with a compass face or with letters (i.e. “NNW”) as well as a numerical value in degrees</a:t>
+            </a:r>
+          </a:p>
+          <a:p>
+            <a:pPr>
+              <a:spcBef>
+                <a:spcPts val="1200"/>
+              </a:spcBef>
+              <a:spcAft>
+                <a:spcPts val="1200"/>
+              </a:spcAft>
+            </a:pPr>
+            <a:r>
+              <a:rPr lang="en-US" dirty="0" smtClean="0"/>
+              <a:t>Be prepared for software updates</a:t>
+            </a:r>
+          </a:p>
+          <a:p>
+            <a:pPr>
+              <a:spcBef>
+                <a:spcPts val="1200"/>
+              </a:spcBef>
+              <a:spcAft>
+                <a:spcPts val="1200"/>
+              </a:spcAft>
+            </a:pPr>
             <a:r>
               <a:rPr lang="en-US" dirty="0" smtClean="0"/>
               <a:t>Display must have a backlight for use in the dark</a:t>
@@ -6525,30 +7185,60 @@
             </a:r>
           </a:p>
           <a:p>
-            <a:pPr marL="0" indent="0">
-              <a:buNone/>
+            <a:pPr lvl="1">
+              <a:spcBef>
+                <a:spcPts val="1200"/>
+              </a:spcBef>
+              <a:spcAft>
+                <a:spcPts val="1200"/>
+              </a:spcAft>
             </a:pPr>
-            <a:endParaRPr lang="en-US" dirty="0" smtClean="0"/>
-          </a:p>
-          <a:p>
-            <a:r>
-              <a:rPr lang="en-US" dirty="0" smtClean="0"/>
-              <a:t>Electronic Compass</a:t>
-            </a:r>
-          </a:p>
-          <a:p>
+            <a:r>
+              <a:rPr lang="en-US" dirty="0" smtClean="0"/>
+              <a:t>Electronic </a:t>
+            </a:r>
+            <a:r>
+              <a:rPr lang="en-US" dirty="0" smtClean="0"/>
+              <a:t>Compass</a:t>
+            </a:r>
+          </a:p>
+          <a:p>
+            <a:pPr lvl="1">
+              <a:spcBef>
+                <a:spcPts val="1200"/>
+              </a:spcBef>
+              <a:spcAft>
+                <a:spcPts val="1200"/>
+              </a:spcAft>
+            </a:pPr>
             <a:r>
               <a:rPr lang="en-US" dirty="0" smtClean="0"/>
               <a:t>Bicycle brake light/blinker system</a:t>
             </a:r>
           </a:p>
           <a:p>
+            <a:pPr lvl="1">
+              <a:spcBef>
+                <a:spcPts val="1200"/>
+              </a:spcBef>
+              <a:spcAft>
+                <a:spcPts val="1200"/>
+              </a:spcAft>
+            </a:pPr>
             <a:r>
               <a:rPr lang="en-US" dirty="0" smtClean="0"/>
               <a:t>Ironman Repulsor Weapon</a:t>
             </a:r>
           </a:p>
           <a:p>
+            <a:pPr lvl="1">
+              <a:spcBef>
+                <a:spcPts val="1200"/>
+              </a:spcBef>
+              <a:spcAft>
+                <a:spcPts val="1200"/>
+              </a:spcAft>
+            </a:pPr>
             <a:r>
               <a:rPr lang="en-US" dirty="0" smtClean="0"/>
               <a:t>Homemade oscilloscope</a:t>
@@ -6680,18 +7370,42 @@
             </a:r>
           </a:p>
           <a:p>
+            <a:pPr>
+              <a:spcBef>
+                <a:spcPts val="1200"/>
+              </a:spcBef>
+              <a:spcAft>
+                <a:spcPts val="1200"/>
+              </a:spcAft>
+            </a:pPr>
             <a:r>
               <a:rPr lang="en-US" dirty="0" smtClean="0"/>
               <a:t>Research major components; understanding setup and operation</a:t>
             </a:r>
           </a:p>
           <a:p>
+            <a:pPr>
+              <a:spcBef>
+                <a:spcPts val="1200"/>
+              </a:spcBef>
+              <a:spcAft>
+                <a:spcPts val="1200"/>
+              </a:spcAft>
+            </a:pPr>
             <a:r>
               <a:rPr lang="en-US" dirty="0" smtClean="0"/>
               <a:t>Order development boards from SparkFun for initial prototyping</a:t>
             </a:r>
           </a:p>
           <a:p>
+            <a:pPr>
+              <a:spcBef>
+                <a:spcPts val="1200"/>
+              </a:spcBef>
+              <a:spcAft>
+                <a:spcPts val="1200"/>
+              </a:spcAft>
+            </a:pPr>
             <a:r>
               <a:rPr lang="en-US" dirty="0" smtClean="0"/>
               <a:t>Defining project requirements</a:t>

</xml_diff>